<commit_message>
create some file to test command line and update file ppt
</commit_message>
<xml_diff>
--- a/commandLine.pptx
+++ b/commandLine.pptx
@@ -5,11 +5,15 @@
     <p:sldMasterId id="2147483648" r:id="rId1"/>
   </p:sldMasterIdLst>
   <p:notesMasterIdLst>
-    <p:notesMasterId r:id="rId4"/>
+    <p:notesMasterId r:id="rId8"/>
   </p:notesMasterIdLst>
   <p:sldIdLst>
     <p:sldId id="258" r:id="rId2"/>
     <p:sldId id="259" r:id="rId3"/>
+    <p:sldId id="260" r:id="rId4"/>
+    <p:sldId id="261" r:id="rId5"/>
+    <p:sldId id="262" r:id="rId6"/>
+    <p:sldId id="263" r:id="rId7"/>
   </p:sldIdLst>
   <p:sldSz cx="12192000" cy="6858000"/>
   <p:notesSz cx="6858000" cy="9144000"/>
@@ -198,7 +202,7 @@
           <a:p>
             <a:fld id="{104062C1-6989-4328-8A66-079EE75EE0FE}" type="datetimeFigureOut">
               <a:rPr lang="en-US" smtClean="0"/>
-              <a:t>6/3/2020</a:t>
+              <a:t>10/3/2020</a:t>
             </a:fld>
             <a:endParaRPr lang="en-US"/>
           </a:p>
@@ -597,7 +601,7 @@
           <a:p>
             <a:fld id="{CA476A9C-2694-4089-A52F-76A265ADFF9D}" type="datetime1">
               <a:rPr lang="en-US" smtClean="0"/>
-              <a:t>6/3/2020</a:t>
+              <a:t>10/3/2020</a:t>
             </a:fld>
             <a:endParaRPr lang="en-US"/>
           </a:p>
@@ -767,7 +771,7 @@
           <a:p>
             <a:fld id="{D64F72A3-8F05-4B22-8E90-281E071413ED}" type="datetime1">
               <a:rPr lang="en-US" smtClean="0"/>
-              <a:t>6/3/2020</a:t>
+              <a:t>10/3/2020</a:t>
             </a:fld>
             <a:endParaRPr lang="en-US"/>
           </a:p>
@@ -947,7 +951,7 @@
           <a:p>
             <a:fld id="{8A91D19B-06D3-46A3-B163-DDB7C53F9382}" type="datetime1">
               <a:rPr lang="en-US" smtClean="0"/>
-              <a:t>6/3/2020</a:t>
+              <a:t>10/3/2020</a:t>
             </a:fld>
             <a:endParaRPr lang="en-US"/>
           </a:p>
@@ -1117,7 +1121,7 @@
           <a:p>
             <a:fld id="{A0A16CC5-FAF8-41CC-9730-AD910C171334}" type="datetime1">
               <a:rPr lang="en-US" smtClean="0"/>
-              <a:t>6/3/2020</a:t>
+              <a:t>10/3/2020</a:t>
             </a:fld>
             <a:endParaRPr lang="en-US"/>
           </a:p>
@@ -1363,7 +1367,7 @@
           <a:p>
             <a:fld id="{142C999F-28E1-4932-AC3F-34D3495B988C}" type="datetime1">
               <a:rPr lang="en-US" smtClean="0"/>
-              <a:t>6/3/2020</a:t>
+              <a:t>10/3/2020</a:t>
             </a:fld>
             <a:endParaRPr lang="en-US"/>
           </a:p>
@@ -1595,7 +1599,7 @@
           <a:p>
             <a:fld id="{EA665678-A6FE-4487-8368-7ADE62C8A783}" type="datetime1">
               <a:rPr lang="en-US" smtClean="0"/>
-              <a:t>6/3/2020</a:t>
+              <a:t>10/3/2020</a:t>
             </a:fld>
             <a:endParaRPr lang="en-US"/>
           </a:p>
@@ -1962,7 +1966,7 @@
           <a:p>
             <a:fld id="{BFC6946C-E5A7-4604-84A4-36DC51C0D0A6}" type="datetime1">
               <a:rPr lang="en-US" smtClean="0"/>
-              <a:t>6/3/2020</a:t>
+              <a:t>10/3/2020</a:t>
             </a:fld>
             <a:endParaRPr lang="en-US"/>
           </a:p>
@@ -2080,7 +2084,7 @@
           <a:p>
             <a:fld id="{740DA3A6-D469-447E-9B6B-6EDC9CD54ED8}" type="datetime1">
               <a:rPr lang="en-US" smtClean="0"/>
-              <a:t>6/3/2020</a:t>
+              <a:t>10/3/2020</a:t>
             </a:fld>
             <a:endParaRPr lang="en-US"/>
           </a:p>
@@ -2175,7 +2179,7 @@
           <a:p>
             <a:fld id="{F54698CD-E344-4502-89F8-0ED6C08BA06B}" type="datetime1">
               <a:rPr lang="en-US" smtClean="0"/>
-              <a:t>6/3/2020</a:t>
+              <a:t>10/3/2020</a:t>
             </a:fld>
             <a:endParaRPr lang="en-US"/>
           </a:p>
@@ -2452,7 +2456,7 @@
           <a:p>
             <a:fld id="{C1A90586-2FE6-41C9-9307-7E263F2A9B38}" type="datetime1">
               <a:rPr lang="en-US" smtClean="0"/>
-              <a:t>6/3/2020</a:t>
+              <a:t>10/3/2020</a:t>
             </a:fld>
             <a:endParaRPr lang="en-US"/>
           </a:p>
@@ -2705,7 +2709,7 @@
           <a:p>
             <a:fld id="{1B36A5C9-EF06-43D2-BB8D-C20B59F7743F}" type="datetime1">
               <a:rPr lang="en-US" smtClean="0"/>
-              <a:t>6/3/2020</a:t>
+              <a:t>10/3/2020</a:t>
             </a:fld>
             <a:endParaRPr lang="en-US"/>
           </a:p>
@@ -2918,7 +2922,7 @@
           <a:p>
             <a:fld id="{C835C6F2-2CD2-4C11-ACED-628D923FCA74}" type="datetime1">
               <a:rPr lang="en-US" smtClean="0"/>
-              <a:t>6/3/2020</a:t>
+              <a:t>10/3/2020</a:t>
             </a:fld>
             <a:endParaRPr lang="en-US"/>
           </a:p>
@@ -3393,7 +3397,7 @@
                 <a:latin typeface="Cambria" panose="02040503050406030204" pitchFamily="18" charset="0"/>
                 <a:ea typeface="Cambria" panose="02040503050406030204" pitchFamily="18" charset="0"/>
               </a:rPr>
-              <a:t>6/3/2020</a:t>
+              <a:t>10/3/2020</a:t>
             </a:fld>
             <a:endParaRPr lang="en-US" b="1" dirty="0">
               <a:solidFill>
@@ -3522,31 +3526,13 @@
           <a:p>
             <a:pPr algn="ctr"/>
             <a:r>
-              <a:rPr lang="en-US" sz="7200" b="1" dirty="0" err="1" smtClean="0">
-                <a:solidFill>
-                  <a:srgbClr val="FF0000"/>
-                </a:solidFill>
-                <a:ea typeface="Cambria" panose="02040503050406030204" pitchFamily="18" charset="0"/>
-              </a:rPr>
-              <a:t>Chủ</a:t>
-            </a:r>
-            <a:r>
               <a:rPr lang="en-US" sz="7200" b="1" dirty="0" smtClean="0">
                 <a:solidFill>
                   <a:srgbClr val="FF0000"/>
                 </a:solidFill>
                 <a:ea typeface="Cambria" panose="02040503050406030204" pitchFamily="18" charset="0"/>
               </a:rPr>
-              <a:t> </a:t>
-            </a:r>
-            <a:r>
-              <a:rPr lang="en-US" sz="7200" b="1" dirty="0" err="1" smtClean="0">
-                <a:solidFill>
-                  <a:srgbClr val="FF0000"/>
-                </a:solidFill>
-                <a:ea typeface="Cambria" panose="02040503050406030204" pitchFamily="18" charset="0"/>
-              </a:rPr>
-              <a:t>đề</a:t>
+              <a:t>Command Line</a:t>
             </a:r>
             <a:endParaRPr lang="en-US" sz="7200" b="1" dirty="0">
               <a:solidFill>
@@ -3652,7 +3638,7 @@
                 <a:latin typeface="Cambria" panose="02040503050406030204" pitchFamily="18" charset="0"/>
                 <a:ea typeface="Cambria" panose="02040503050406030204" pitchFamily="18" charset="0"/>
               </a:rPr>
-              <a:t>6/3/2020</a:t>
+              <a:t>10/3/2020</a:t>
             </a:fld>
             <a:endParaRPr lang="en-US" b="1" dirty="0">
               <a:solidFill>
@@ -3780,31 +3766,13 @@
           <a:lstStyle/>
           <a:p>
             <a:r>
-              <a:rPr lang="en-US" sz="3200" b="1" dirty="0" err="1" smtClean="0">
-                <a:solidFill>
-                  <a:srgbClr val="0070C0"/>
-                </a:solidFill>
-                <a:ea typeface="Cambria" panose="02040503050406030204" pitchFamily="18" charset="0"/>
-              </a:rPr>
-              <a:t>Tiêu</a:t>
-            </a:r>
-            <a:r>
               <a:rPr lang="en-US" sz="3200" b="1" dirty="0" smtClean="0">
                 <a:solidFill>
                   <a:srgbClr val="0070C0"/>
                 </a:solidFill>
                 <a:ea typeface="Cambria" panose="02040503050406030204" pitchFamily="18" charset="0"/>
               </a:rPr>
-              <a:t> </a:t>
-            </a:r>
-            <a:r>
-              <a:rPr lang="en-US" sz="3200" b="1" dirty="0" err="1" smtClean="0">
-                <a:solidFill>
-                  <a:srgbClr val="0070C0"/>
-                </a:solidFill>
-                <a:ea typeface="Cambria" panose="02040503050406030204" pitchFamily="18" charset="0"/>
-              </a:rPr>
-              <a:t>đề</a:t>
+              <a:t>Terminal</a:t>
             </a:r>
             <a:endParaRPr lang="en-US" sz="3200" b="1" dirty="0">
               <a:solidFill>
@@ -3846,10 +3814,2716 @@
           </a:fontRef>
         </p:style>
       </p:cxnSp>
+      <p:sp>
+        <p:nvSpPr>
+          <p:cNvPr id="3" name="TextBox 2"/>
+          <p:cNvSpPr txBox="1"/>
+          <p:nvPr/>
+        </p:nvSpPr>
+        <p:spPr>
+          <a:xfrm>
+            <a:off x="624107" y="1175657"/>
+            <a:ext cx="10871207" cy="1200329"/>
+          </a:xfrm>
+          <a:prstGeom prst="rect">
+            <a:avLst/>
+          </a:prstGeom>
+          <a:noFill/>
+        </p:spPr>
+        <p:txBody>
+          <a:bodyPr wrap="square" rtlCol="0">
+            <a:spAutoFit/>
+          </a:bodyPr>
+          <a:lstStyle/>
+          <a:p>
+            <a:pPr marL="285750" indent="-285750">
+              <a:buFont typeface="Arial" panose="020B0604020202020204" pitchFamily="34" charset="0"/>
+              <a:buChar char="•"/>
+            </a:pPr>
+            <a:r>
+              <a:rPr lang="en-US" sz="2400" dirty="0" smtClean="0"/>
+              <a:t>Window: download </a:t>
+            </a:r>
+            <a:r>
+              <a:rPr lang="en-US" sz="2400" dirty="0" err="1" smtClean="0"/>
+              <a:t>cmder</a:t>
+            </a:r>
+            <a:endParaRPr lang="en-US" sz="2400" dirty="0" smtClean="0"/>
+          </a:p>
+          <a:p>
+            <a:pPr marL="285750" indent="-285750">
+              <a:buFont typeface="Arial" panose="020B0604020202020204" pitchFamily="34" charset="0"/>
+              <a:buChar char="•"/>
+            </a:pPr>
+            <a:endParaRPr lang="en-US" sz="2400" dirty="0"/>
+          </a:p>
+          <a:p>
+            <a:pPr marL="285750" indent="-285750">
+              <a:buFont typeface="Arial" panose="020B0604020202020204" pitchFamily="34" charset="0"/>
+              <a:buChar char="•"/>
+            </a:pPr>
+            <a:r>
+              <a:rPr lang="en-US" sz="2400" dirty="0" smtClean="0"/>
+              <a:t>Linux/</a:t>
+            </a:r>
+            <a:r>
+              <a:rPr lang="en-US" sz="2400" dirty="0" err="1" smtClean="0"/>
+              <a:t>MacOs</a:t>
+            </a:r>
+            <a:r>
+              <a:rPr lang="en-US" sz="2400" dirty="0" smtClean="0"/>
+              <a:t>: </a:t>
+            </a:r>
+            <a:r>
+              <a:rPr lang="en-US" sz="2400" dirty="0" err="1" smtClean="0"/>
+              <a:t>có</a:t>
+            </a:r>
+            <a:r>
+              <a:rPr lang="en-US" sz="2400" dirty="0" smtClean="0"/>
+              <a:t> </a:t>
+            </a:r>
+            <a:r>
+              <a:rPr lang="en-US" sz="2400" dirty="0" err="1" smtClean="0"/>
+              <a:t>sẵn</a:t>
+            </a:r>
+            <a:r>
+              <a:rPr lang="en-US" sz="2400" dirty="0" smtClean="0"/>
+              <a:t> Terminal</a:t>
+            </a:r>
+            <a:endParaRPr lang="en-US" sz="2400" dirty="0"/>
+          </a:p>
+        </p:txBody>
+      </p:sp>
+      <p:pic>
+        <p:nvPicPr>
+          <p:cNvPr id="9" name="Picture 8"/>
+          <p:cNvPicPr>
+            <a:picLocks noChangeAspect="1"/>
+          </p:cNvPicPr>
+          <p:nvPr/>
+        </p:nvPicPr>
+        <p:blipFill>
+          <a:blip r:embed="rId2"/>
+          <a:stretch>
+            <a:fillRect/>
+          </a:stretch>
+        </p:blipFill>
+        <p:spPr>
+          <a:xfrm>
+            <a:off x="5167086" y="1175657"/>
+            <a:ext cx="6328228" cy="3795329"/>
+          </a:xfrm>
+          <a:prstGeom prst="rect">
+            <a:avLst/>
+          </a:prstGeom>
+        </p:spPr>
+      </p:pic>
     </p:spTree>
     <p:extLst>
       <p:ext uri="{BB962C8B-B14F-4D97-AF65-F5344CB8AC3E}">
         <p14:creationId xmlns:p14="http://schemas.microsoft.com/office/powerpoint/2010/main" val="2004280416"/>
+      </p:ext>
+    </p:extLst>
+  </p:cSld>
+  <p:clrMapOvr>
+    <a:masterClrMapping/>
+  </p:clrMapOvr>
+  <p:timing>
+    <p:tnLst>
+      <p:par>
+        <p:cTn id="1" dur="indefinite" restart="never" nodeType="tmRoot"/>
+      </p:par>
+    </p:tnLst>
+  </p:timing>
+</p:sld>
+</file>
+
+<file path=ppt/slides/slide3.xml><?xml version="1.0" encoding="utf-8"?>
+<p:sld xmlns:a="http://schemas.openxmlformats.org/drawingml/2006/main" xmlns:r="http://schemas.openxmlformats.org/officeDocument/2006/relationships" xmlns:p="http://schemas.openxmlformats.org/presentationml/2006/main">
+  <p:cSld>
+    <p:spTree>
+      <p:nvGrpSpPr>
+        <p:cNvPr id="1" name=""/>
+        <p:cNvGrpSpPr/>
+        <p:nvPr/>
+      </p:nvGrpSpPr>
+      <p:grpSpPr>
+        <a:xfrm>
+          <a:off x="0" y="0"/>
+          <a:ext cx="0" cy="0"/>
+          <a:chOff x="0" y="0"/>
+          <a:chExt cx="0" cy="0"/>
+        </a:xfrm>
+      </p:grpSpPr>
+      <p:cxnSp>
+        <p:nvCxnSpPr>
+          <p:cNvPr id="6" name="Straight Connector 5"/>
+          <p:cNvCxnSpPr/>
+          <p:nvPr/>
+        </p:nvCxnSpPr>
+        <p:spPr>
+          <a:xfrm>
+            <a:off x="420907" y="6517696"/>
+            <a:ext cx="11430000" cy="0"/>
+          </a:xfrm>
+          <a:prstGeom prst="line">
+            <a:avLst/>
+          </a:prstGeom>
+        </p:spPr>
+        <p:style>
+          <a:lnRef idx="1">
+            <a:schemeClr val="accent1"/>
+          </a:lnRef>
+          <a:fillRef idx="0">
+            <a:schemeClr val="accent1"/>
+          </a:fillRef>
+          <a:effectRef idx="0">
+            <a:schemeClr val="accent1"/>
+          </a:effectRef>
+          <a:fontRef idx="minor">
+            <a:schemeClr val="tx1"/>
+          </a:fontRef>
+        </p:style>
+      </p:cxnSp>
+      <p:sp>
+        <p:nvSpPr>
+          <p:cNvPr id="5" name="Date Placeholder 4"/>
+          <p:cNvSpPr>
+            <a:spLocks noGrp="1"/>
+          </p:cNvSpPr>
+          <p:nvPr>
+            <p:ph type="dt" sz="half" idx="10"/>
+          </p:nvPr>
+        </p:nvSpPr>
+        <p:spPr>
+          <a:xfrm>
+            <a:off x="348328" y="6492875"/>
+            <a:ext cx="2743200" cy="365124"/>
+          </a:xfrm>
+        </p:spPr>
+        <p:txBody>
+          <a:bodyPr/>
+          <a:lstStyle/>
+          <a:p>
+            <a:fld id="{584BC27B-D6E5-4158-AEF2-1A466C5D5036}" type="datetime1">
+              <a:rPr lang="en-US" b="1" smtClean="0">
+                <a:solidFill>
+                  <a:srgbClr val="00B050"/>
+                </a:solidFill>
+                <a:latin typeface="Cambria" panose="02040503050406030204" pitchFamily="18" charset="0"/>
+                <a:ea typeface="Cambria" panose="02040503050406030204" pitchFamily="18" charset="0"/>
+              </a:rPr>
+              <a:t>10/3/2020</a:t>
+            </a:fld>
+            <a:endParaRPr lang="en-US" b="1" dirty="0">
+              <a:solidFill>
+                <a:srgbClr val="00B050"/>
+              </a:solidFill>
+              <a:latin typeface="Cambria" panose="02040503050406030204" pitchFamily="18" charset="0"/>
+              <a:ea typeface="Cambria" panose="02040503050406030204" pitchFamily="18" charset="0"/>
+            </a:endParaRPr>
+          </a:p>
+        </p:txBody>
+      </p:sp>
+      <p:sp>
+        <p:nvSpPr>
+          <p:cNvPr id="7" name="Footer Placeholder 6"/>
+          <p:cNvSpPr>
+            <a:spLocks noGrp="1"/>
+          </p:cNvSpPr>
+          <p:nvPr>
+            <p:ph type="ftr" sz="quarter" idx="11"/>
+          </p:nvPr>
+        </p:nvSpPr>
+        <p:spPr>
+          <a:xfrm>
+            <a:off x="9739086" y="6516914"/>
+            <a:ext cx="2184399" cy="341086"/>
+          </a:xfrm>
+        </p:spPr>
+        <p:txBody>
+          <a:bodyPr/>
+          <a:lstStyle/>
+          <a:p>
+            <a:pPr algn="r"/>
+            <a:r>
+              <a:rPr lang="en-US" b="1" dirty="0" err="1" smtClean="0">
+                <a:solidFill>
+                  <a:srgbClr val="00B050"/>
+                </a:solidFill>
+                <a:latin typeface="Cambria" panose="02040503050406030204" pitchFamily="18" charset="0"/>
+                <a:ea typeface="Cambria" panose="02040503050406030204" pitchFamily="18" charset="0"/>
+              </a:rPr>
+              <a:t>Tuấn</a:t>
+            </a:r>
+            <a:r>
+              <a:rPr lang="en-US" b="1" dirty="0" smtClean="0">
+                <a:solidFill>
+                  <a:srgbClr val="00B050"/>
+                </a:solidFill>
+                <a:latin typeface="Cambria" panose="02040503050406030204" pitchFamily="18" charset="0"/>
+                <a:ea typeface="Cambria" panose="02040503050406030204" pitchFamily="18" charset="0"/>
+              </a:rPr>
+              <a:t> Khoa</a:t>
+            </a:r>
+            <a:endParaRPr lang="en-US" b="1" dirty="0">
+              <a:solidFill>
+                <a:srgbClr val="00B050"/>
+              </a:solidFill>
+              <a:latin typeface="Cambria" panose="02040503050406030204" pitchFamily="18" charset="0"/>
+              <a:ea typeface="Cambria" panose="02040503050406030204" pitchFamily="18" charset="0"/>
+            </a:endParaRPr>
+          </a:p>
+        </p:txBody>
+      </p:sp>
+      <p:sp>
+        <p:nvSpPr>
+          <p:cNvPr id="8" name="Slide Number Placeholder 7"/>
+          <p:cNvSpPr>
+            <a:spLocks noGrp="1"/>
+          </p:cNvSpPr>
+          <p:nvPr>
+            <p:ph type="sldNum" sz="quarter" idx="12"/>
+          </p:nvPr>
+        </p:nvSpPr>
+        <p:spPr>
+          <a:xfrm>
+            <a:off x="4764307" y="6542518"/>
+            <a:ext cx="2743200" cy="315481"/>
+          </a:xfrm>
+        </p:spPr>
+        <p:txBody>
+          <a:bodyPr/>
+          <a:lstStyle/>
+          <a:p>
+            <a:pPr algn="ctr"/>
+            <a:fld id="{CEE3C117-CD36-4311-9030-17CD772F032C}" type="slidenum">
+              <a:rPr lang="en-US" b="1" smtClean="0">
+                <a:solidFill>
+                  <a:srgbClr val="00B050"/>
+                </a:solidFill>
+                <a:latin typeface="Cambria" panose="02040503050406030204" pitchFamily="18" charset="0"/>
+                <a:ea typeface="Cambria" panose="02040503050406030204" pitchFamily="18" charset="0"/>
+              </a:rPr>
+              <a:pPr algn="ctr"/>
+              <a:t>3</a:t>
+            </a:fld>
+            <a:endParaRPr lang="en-US" b="1" dirty="0">
+              <a:solidFill>
+                <a:srgbClr val="00B050"/>
+              </a:solidFill>
+              <a:latin typeface="Cambria" panose="02040503050406030204" pitchFamily="18" charset="0"/>
+              <a:ea typeface="Cambria" panose="02040503050406030204" pitchFamily="18" charset="0"/>
+            </a:endParaRPr>
+          </a:p>
+        </p:txBody>
+      </p:sp>
+      <p:sp>
+        <p:nvSpPr>
+          <p:cNvPr id="2" name="TextBox 1"/>
+          <p:cNvSpPr txBox="1"/>
+          <p:nvPr/>
+        </p:nvSpPr>
+        <p:spPr>
+          <a:xfrm>
+            <a:off x="551529" y="203198"/>
+            <a:ext cx="11502578" cy="584775"/>
+          </a:xfrm>
+          <a:prstGeom prst="rect">
+            <a:avLst/>
+          </a:prstGeom>
+          <a:noFill/>
+        </p:spPr>
+        <p:txBody>
+          <a:bodyPr wrap="square" rtlCol="0">
+            <a:spAutoFit/>
+          </a:bodyPr>
+          <a:lstStyle/>
+          <a:p>
+            <a:r>
+              <a:rPr lang="en-US" sz="3200" b="1" dirty="0" err="1" smtClean="0">
+                <a:solidFill>
+                  <a:srgbClr val="0070C0"/>
+                </a:solidFill>
+                <a:ea typeface="Cambria" panose="02040503050406030204" pitchFamily="18" charset="0"/>
+              </a:rPr>
+              <a:t>Các</a:t>
+            </a:r>
+            <a:r>
+              <a:rPr lang="en-US" sz="3200" b="1" dirty="0" smtClean="0">
+                <a:solidFill>
+                  <a:srgbClr val="0070C0"/>
+                </a:solidFill>
+                <a:ea typeface="Cambria" panose="02040503050406030204" pitchFamily="18" charset="0"/>
+              </a:rPr>
+              <a:t> </a:t>
+            </a:r>
+            <a:r>
+              <a:rPr lang="en-US" sz="3200" b="1" dirty="0" err="1" smtClean="0">
+                <a:solidFill>
+                  <a:srgbClr val="0070C0"/>
+                </a:solidFill>
+                <a:ea typeface="Cambria" panose="02040503050406030204" pitchFamily="18" charset="0"/>
+              </a:rPr>
+              <a:t>lệnh</a:t>
+            </a:r>
+            <a:r>
+              <a:rPr lang="en-US" sz="3200" b="1" dirty="0" smtClean="0">
+                <a:solidFill>
+                  <a:srgbClr val="0070C0"/>
+                </a:solidFill>
+                <a:ea typeface="Cambria" panose="02040503050406030204" pitchFamily="18" charset="0"/>
+              </a:rPr>
+              <a:t> </a:t>
+            </a:r>
+            <a:r>
+              <a:rPr lang="en-US" sz="3200" b="1" dirty="0" err="1" smtClean="0">
+                <a:solidFill>
+                  <a:srgbClr val="0070C0"/>
+                </a:solidFill>
+                <a:ea typeface="Cambria" panose="02040503050406030204" pitchFamily="18" charset="0"/>
+              </a:rPr>
+              <a:t>cơ</a:t>
+            </a:r>
+            <a:r>
+              <a:rPr lang="en-US" sz="3200" b="1" dirty="0" smtClean="0">
+                <a:solidFill>
+                  <a:srgbClr val="0070C0"/>
+                </a:solidFill>
+                <a:ea typeface="Cambria" panose="02040503050406030204" pitchFamily="18" charset="0"/>
+              </a:rPr>
+              <a:t> </a:t>
+            </a:r>
+            <a:r>
+              <a:rPr lang="en-US" sz="3200" b="1" dirty="0" err="1" smtClean="0">
+                <a:solidFill>
+                  <a:srgbClr val="0070C0"/>
+                </a:solidFill>
+                <a:ea typeface="Cambria" panose="02040503050406030204" pitchFamily="18" charset="0"/>
+              </a:rPr>
+              <a:t>bản</a:t>
+            </a:r>
+            <a:endParaRPr lang="en-US" sz="3200" b="1" dirty="0">
+              <a:solidFill>
+                <a:srgbClr val="0070C0"/>
+              </a:solidFill>
+              <a:ea typeface="Cambria" panose="02040503050406030204" pitchFamily="18" charset="0"/>
+            </a:endParaRPr>
+          </a:p>
+        </p:txBody>
+      </p:sp>
+      <p:cxnSp>
+        <p:nvCxnSpPr>
+          <p:cNvPr id="4" name="Straight Connector 3"/>
+          <p:cNvCxnSpPr/>
+          <p:nvPr/>
+        </p:nvCxnSpPr>
+        <p:spPr>
+          <a:xfrm flipV="1">
+            <a:off x="624107" y="769961"/>
+            <a:ext cx="2743200" cy="0"/>
+          </a:xfrm>
+          <a:prstGeom prst="line">
+            <a:avLst/>
+          </a:prstGeom>
+          <a:ln w="38100"/>
+        </p:spPr>
+        <p:style>
+          <a:lnRef idx="3">
+            <a:schemeClr val="accent6"/>
+          </a:lnRef>
+          <a:fillRef idx="0">
+            <a:schemeClr val="accent6"/>
+          </a:fillRef>
+          <a:effectRef idx="2">
+            <a:schemeClr val="accent6"/>
+          </a:effectRef>
+          <a:fontRef idx="minor">
+            <a:schemeClr val="tx1"/>
+          </a:fontRef>
+        </p:style>
+      </p:cxnSp>
+      <p:sp>
+        <p:nvSpPr>
+          <p:cNvPr id="3" name="TextBox 2"/>
+          <p:cNvSpPr txBox="1"/>
+          <p:nvPr/>
+        </p:nvSpPr>
+        <p:spPr>
+          <a:xfrm>
+            <a:off x="624107" y="1175657"/>
+            <a:ext cx="10871207" cy="4154984"/>
+          </a:xfrm>
+          <a:prstGeom prst="rect">
+            <a:avLst/>
+          </a:prstGeom>
+          <a:noFill/>
+        </p:spPr>
+        <p:txBody>
+          <a:bodyPr wrap="square" rtlCol="0">
+            <a:spAutoFit/>
+          </a:bodyPr>
+          <a:lstStyle/>
+          <a:p>
+            <a:pPr marL="285750" indent="-285750">
+              <a:buFont typeface="Arial" panose="020B0604020202020204" pitchFamily="34" charset="0"/>
+              <a:buChar char="•"/>
+            </a:pPr>
+            <a:r>
+              <a:rPr lang="en-US" sz="2400" dirty="0" err="1" smtClean="0"/>
+              <a:t>Pwd</a:t>
+            </a:r>
+            <a:r>
+              <a:rPr lang="en-US" sz="2400" dirty="0" smtClean="0"/>
+              <a:t>: </a:t>
+            </a:r>
+            <a:r>
+              <a:rPr lang="en-US" sz="2400" dirty="0" err="1" smtClean="0"/>
+              <a:t>Lấy</a:t>
+            </a:r>
+            <a:r>
+              <a:rPr lang="en-US" sz="2400" dirty="0" smtClean="0"/>
+              <a:t> </a:t>
+            </a:r>
+            <a:r>
+              <a:rPr lang="en-US" sz="2400" dirty="0" err="1" smtClean="0"/>
+              <a:t>đường</a:t>
+            </a:r>
+            <a:r>
+              <a:rPr lang="en-US" sz="2400" dirty="0" smtClean="0"/>
+              <a:t> </a:t>
+            </a:r>
+            <a:r>
+              <a:rPr lang="en-US" sz="2400" dirty="0" err="1" smtClean="0"/>
+              <a:t>dẫn</a:t>
+            </a:r>
+            <a:r>
+              <a:rPr lang="en-US" sz="2400" dirty="0" smtClean="0"/>
+              <a:t> </a:t>
+            </a:r>
+            <a:r>
+              <a:rPr lang="en-US" sz="2400" dirty="0" err="1" smtClean="0"/>
+              <a:t>hiện</a:t>
+            </a:r>
+            <a:r>
+              <a:rPr lang="en-US" sz="2400" dirty="0" smtClean="0"/>
+              <a:t> </a:t>
+            </a:r>
+            <a:r>
+              <a:rPr lang="en-US" sz="2400" dirty="0" err="1" smtClean="0"/>
+              <a:t>tại</a:t>
+            </a:r>
+            <a:endParaRPr lang="en-US" sz="2400" dirty="0" smtClean="0"/>
+          </a:p>
+          <a:p>
+            <a:pPr marL="285750" indent="-285750">
+              <a:buFont typeface="Arial" panose="020B0604020202020204" pitchFamily="34" charset="0"/>
+              <a:buChar char="•"/>
+            </a:pPr>
+            <a:endParaRPr lang="en-US" sz="2400" dirty="0" smtClean="0"/>
+          </a:p>
+          <a:p>
+            <a:pPr marL="285750" indent="-285750">
+              <a:buFont typeface="Arial" panose="020B0604020202020204" pitchFamily="34" charset="0"/>
+              <a:buChar char="•"/>
+            </a:pPr>
+            <a:r>
+              <a:rPr lang="en-US" sz="2400" dirty="0" smtClean="0"/>
+              <a:t>cd: </a:t>
+            </a:r>
+            <a:r>
+              <a:rPr lang="en-US" sz="2400" dirty="0" err="1" smtClean="0"/>
+              <a:t>đường</a:t>
+            </a:r>
+            <a:r>
+              <a:rPr lang="en-US" sz="2400" dirty="0" smtClean="0"/>
+              <a:t> </a:t>
+            </a:r>
+            <a:r>
+              <a:rPr lang="en-US" sz="2400" dirty="0" err="1" smtClean="0"/>
+              <a:t>dẫn</a:t>
+            </a:r>
+            <a:r>
+              <a:rPr lang="en-US" sz="2400" dirty="0" smtClean="0"/>
+              <a:t> </a:t>
+            </a:r>
+            <a:r>
+              <a:rPr lang="en-US" sz="2400" dirty="0" err="1" smtClean="0"/>
+              <a:t>tới</a:t>
+            </a:r>
+            <a:r>
+              <a:rPr lang="en-US" sz="2400" dirty="0" smtClean="0"/>
+              <a:t> </a:t>
+            </a:r>
+            <a:r>
+              <a:rPr lang="en-US" sz="2400" dirty="0" err="1" smtClean="0"/>
+              <a:t>thư</a:t>
+            </a:r>
+            <a:r>
+              <a:rPr lang="en-US" sz="2400" dirty="0" smtClean="0"/>
+              <a:t> </a:t>
+            </a:r>
+            <a:r>
+              <a:rPr lang="en-US" sz="2400" dirty="0" err="1" smtClean="0"/>
+              <a:t>mục</a:t>
+            </a:r>
+            <a:r>
+              <a:rPr lang="en-US" sz="2400" dirty="0" smtClean="0"/>
+              <a:t> </a:t>
+            </a:r>
+            <a:r>
+              <a:rPr lang="en-US" sz="2400" dirty="0" err="1" smtClean="0"/>
+              <a:t>muốn</a:t>
+            </a:r>
+            <a:r>
+              <a:rPr lang="en-US" sz="2400" dirty="0" smtClean="0"/>
+              <a:t> </a:t>
+            </a:r>
+            <a:r>
+              <a:rPr lang="en-US" sz="2400" dirty="0" err="1" smtClean="0"/>
+              <a:t>đến</a:t>
+            </a:r>
+            <a:r>
+              <a:rPr lang="en-US" sz="2400" dirty="0" smtClean="0"/>
+              <a:t> (</a:t>
+            </a:r>
+            <a:r>
+              <a:rPr lang="en-US" sz="2400" dirty="0" err="1" smtClean="0"/>
+              <a:t>vd</a:t>
+            </a:r>
+            <a:r>
+              <a:rPr lang="en-US" sz="2400" dirty="0" smtClean="0"/>
+              <a:t>: cd </a:t>
+            </a:r>
+            <a:r>
+              <a:rPr lang="en-US" sz="2400" dirty="0" err="1" smtClean="0"/>
+              <a:t>abc</a:t>
+            </a:r>
+            <a:r>
+              <a:rPr lang="en-US" sz="2400" dirty="0" smtClean="0"/>
+              <a:t>/xyz -&gt; </a:t>
+            </a:r>
+            <a:r>
+              <a:rPr lang="en-US" sz="2400" dirty="0" err="1" smtClean="0"/>
+              <a:t>tới</a:t>
+            </a:r>
+            <a:r>
+              <a:rPr lang="en-US" sz="2400" dirty="0" smtClean="0"/>
+              <a:t> </a:t>
+            </a:r>
+            <a:r>
+              <a:rPr lang="en-US" sz="2400" dirty="0" err="1" smtClean="0"/>
+              <a:t>thư</a:t>
+            </a:r>
+            <a:r>
+              <a:rPr lang="en-US" sz="2400" dirty="0" smtClean="0"/>
+              <a:t> </a:t>
+            </a:r>
+            <a:r>
+              <a:rPr lang="en-US" sz="2400" dirty="0" err="1" smtClean="0"/>
+              <a:t>mục</a:t>
+            </a:r>
+            <a:r>
+              <a:rPr lang="en-US" sz="2400" dirty="0" smtClean="0"/>
+              <a:t> xyz </a:t>
+            </a:r>
+            <a:r>
+              <a:rPr lang="en-US" sz="2400" dirty="0" err="1" smtClean="0"/>
+              <a:t>trong</a:t>
+            </a:r>
+            <a:r>
+              <a:rPr lang="en-US" sz="2400" dirty="0" smtClean="0"/>
+              <a:t> </a:t>
+            </a:r>
+            <a:r>
+              <a:rPr lang="en-US" sz="2400" dirty="0" err="1" smtClean="0"/>
+              <a:t>abc</a:t>
+            </a:r>
+            <a:r>
+              <a:rPr lang="en-US" sz="2400" dirty="0" smtClean="0"/>
+              <a:t>; cd .. -&gt; </a:t>
+            </a:r>
+            <a:r>
+              <a:rPr lang="en-US" sz="2400" dirty="0" err="1" smtClean="0"/>
+              <a:t>trở</a:t>
+            </a:r>
+            <a:r>
+              <a:rPr lang="en-US" sz="2400" dirty="0" smtClean="0"/>
+              <a:t> </a:t>
+            </a:r>
+            <a:r>
+              <a:rPr lang="en-US" sz="2400" dirty="0" err="1" smtClean="0"/>
+              <a:t>về</a:t>
+            </a:r>
+            <a:r>
+              <a:rPr lang="en-US" sz="2400" dirty="0" smtClean="0"/>
+              <a:t> </a:t>
+            </a:r>
+            <a:r>
+              <a:rPr lang="en-US" sz="2400" dirty="0" err="1" smtClean="0"/>
+              <a:t>thư</a:t>
+            </a:r>
+            <a:r>
+              <a:rPr lang="en-US" sz="2400" dirty="0" smtClean="0"/>
+              <a:t> </a:t>
+            </a:r>
+            <a:r>
+              <a:rPr lang="en-US" sz="2400" dirty="0" err="1" smtClean="0"/>
+              <a:t>mục</a:t>
+            </a:r>
+            <a:r>
+              <a:rPr lang="en-US" sz="2400" dirty="0" smtClean="0"/>
+              <a:t> </a:t>
+            </a:r>
+            <a:r>
+              <a:rPr lang="en-US" sz="2400" dirty="0" err="1" smtClean="0"/>
+              <a:t>trước</a:t>
+            </a:r>
+            <a:r>
+              <a:rPr lang="en-US" sz="2400" dirty="0" smtClean="0"/>
+              <a:t>)</a:t>
+            </a:r>
+          </a:p>
+          <a:p>
+            <a:pPr marL="285750" indent="-285750">
+              <a:buFont typeface="Arial" panose="020B0604020202020204" pitchFamily="34" charset="0"/>
+              <a:buChar char="•"/>
+            </a:pPr>
+            <a:endParaRPr lang="en-US" sz="2400" dirty="0" smtClean="0"/>
+          </a:p>
+          <a:p>
+            <a:pPr marL="285750" indent="-285750">
+              <a:buFont typeface="Arial" panose="020B0604020202020204" pitchFamily="34" charset="0"/>
+              <a:buChar char="•"/>
+            </a:pPr>
+            <a:r>
+              <a:rPr lang="en-US" sz="2400" dirty="0"/>
+              <a:t>Ls: </a:t>
+            </a:r>
+            <a:r>
+              <a:rPr lang="en-US" sz="2400" dirty="0" err="1"/>
+              <a:t>xem</a:t>
+            </a:r>
+            <a:r>
+              <a:rPr lang="en-US" sz="2400" dirty="0"/>
+              <a:t> </a:t>
+            </a:r>
+            <a:r>
+              <a:rPr lang="en-US" sz="2400" dirty="0" err="1"/>
+              <a:t>tất</a:t>
+            </a:r>
+            <a:r>
+              <a:rPr lang="en-US" sz="2400" dirty="0"/>
+              <a:t> </a:t>
+            </a:r>
+            <a:r>
+              <a:rPr lang="en-US" sz="2400" dirty="0" err="1"/>
+              <a:t>cả</a:t>
+            </a:r>
+            <a:r>
+              <a:rPr lang="en-US" sz="2400" dirty="0"/>
+              <a:t> </a:t>
+            </a:r>
+            <a:r>
+              <a:rPr lang="en-US" sz="2400" dirty="0" err="1"/>
+              <a:t>các</a:t>
+            </a:r>
+            <a:r>
+              <a:rPr lang="en-US" sz="2400" dirty="0"/>
+              <a:t> files </a:t>
+            </a:r>
+            <a:r>
+              <a:rPr lang="en-US" sz="2400" dirty="0" err="1"/>
+              <a:t>có</a:t>
+            </a:r>
+            <a:r>
+              <a:rPr lang="en-US" sz="2400" dirty="0"/>
+              <a:t> </a:t>
+            </a:r>
+            <a:r>
+              <a:rPr lang="en-US" sz="2400" dirty="0" err="1"/>
+              <a:t>trong</a:t>
+            </a:r>
+            <a:r>
+              <a:rPr lang="en-US" sz="2400" dirty="0"/>
+              <a:t> </a:t>
+            </a:r>
+            <a:r>
+              <a:rPr lang="en-US" sz="2400" dirty="0" err="1" smtClean="0"/>
+              <a:t>thư</a:t>
+            </a:r>
+            <a:r>
+              <a:rPr lang="en-US" sz="2400" dirty="0" smtClean="0"/>
+              <a:t> </a:t>
+            </a:r>
+            <a:r>
+              <a:rPr lang="en-US" sz="2400" dirty="0" err="1" smtClean="0"/>
+              <a:t>mục</a:t>
+            </a:r>
+            <a:endParaRPr lang="en-US" sz="2400" dirty="0" smtClean="0"/>
+          </a:p>
+          <a:p>
+            <a:pPr marL="285750" indent="-285750">
+              <a:buFont typeface="Arial" panose="020B0604020202020204" pitchFamily="34" charset="0"/>
+              <a:buChar char="•"/>
+            </a:pPr>
+            <a:endParaRPr lang="en-US" sz="2400" dirty="0"/>
+          </a:p>
+          <a:p>
+            <a:pPr marL="285750" indent="-285750">
+              <a:buFont typeface="Arial" panose="020B0604020202020204" pitchFamily="34" charset="0"/>
+              <a:buChar char="•"/>
+            </a:pPr>
+            <a:r>
+              <a:rPr lang="en-US" sz="2400" dirty="0" smtClean="0"/>
+              <a:t>Ls –la (-</a:t>
+            </a:r>
+            <a:r>
+              <a:rPr lang="en-US" sz="2400" dirty="0" err="1" smtClean="0"/>
+              <a:t>lah</a:t>
+            </a:r>
+            <a:r>
+              <a:rPr lang="en-US" sz="2400" dirty="0" smtClean="0"/>
+              <a:t>): </a:t>
+            </a:r>
+            <a:r>
+              <a:rPr lang="en-US" sz="2400" dirty="0" err="1" smtClean="0"/>
+              <a:t>xem</a:t>
+            </a:r>
+            <a:r>
+              <a:rPr lang="en-US" sz="2400" dirty="0" smtClean="0"/>
+              <a:t> details </a:t>
+            </a:r>
+            <a:r>
+              <a:rPr lang="en-US" sz="2400" dirty="0" err="1" smtClean="0"/>
+              <a:t>các</a:t>
+            </a:r>
+            <a:r>
+              <a:rPr lang="en-US" sz="2400" dirty="0" smtClean="0"/>
+              <a:t> files </a:t>
+            </a:r>
+            <a:r>
+              <a:rPr lang="en-US" sz="2400" dirty="0" err="1" smtClean="0"/>
+              <a:t>trong</a:t>
+            </a:r>
+            <a:r>
+              <a:rPr lang="en-US" sz="2400" dirty="0" smtClean="0"/>
+              <a:t> </a:t>
+            </a:r>
+            <a:r>
+              <a:rPr lang="en-US" sz="2400" dirty="0" err="1" smtClean="0"/>
+              <a:t>thư</a:t>
+            </a:r>
+            <a:r>
+              <a:rPr lang="en-US" sz="2400" dirty="0" smtClean="0"/>
+              <a:t> </a:t>
+            </a:r>
+            <a:r>
+              <a:rPr lang="en-US" sz="2400" dirty="0" err="1" smtClean="0"/>
+              <a:t>mục</a:t>
+            </a:r>
+            <a:r>
+              <a:rPr lang="en-US" sz="2400" dirty="0" smtClean="0"/>
+              <a:t> </a:t>
+            </a:r>
+            <a:r>
+              <a:rPr lang="en-US" sz="2400" dirty="0" err="1" smtClean="0"/>
+              <a:t>hiện</a:t>
+            </a:r>
+            <a:r>
+              <a:rPr lang="en-US" sz="2400" dirty="0" smtClean="0"/>
+              <a:t> </a:t>
+            </a:r>
+            <a:r>
+              <a:rPr lang="en-US" sz="2400" dirty="0" err="1" smtClean="0"/>
+              <a:t>tại</a:t>
+            </a:r>
+            <a:endParaRPr lang="en-US" sz="2400" dirty="0" smtClean="0"/>
+          </a:p>
+          <a:p>
+            <a:pPr marL="285750" indent="-285750">
+              <a:buFont typeface="Arial" panose="020B0604020202020204" pitchFamily="34" charset="0"/>
+              <a:buChar char="•"/>
+            </a:pPr>
+            <a:endParaRPr lang="en-US" sz="2400" dirty="0" smtClean="0"/>
+          </a:p>
+          <a:p>
+            <a:pPr marL="285750" indent="-285750">
+              <a:buFont typeface="Arial" panose="020B0604020202020204" pitchFamily="34" charset="0"/>
+              <a:buChar char="•"/>
+            </a:pPr>
+            <a:r>
+              <a:rPr lang="en-US" sz="2400" dirty="0" err="1" smtClean="0"/>
+              <a:t>Mkdir</a:t>
+            </a:r>
+            <a:r>
+              <a:rPr lang="en-US" sz="2400" dirty="0" smtClean="0"/>
+              <a:t> </a:t>
+            </a:r>
+            <a:r>
+              <a:rPr lang="en-US" sz="2400" dirty="0" err="1" smtClean="0"/>
+              <a:t>abc</a:t>
+            </a:r>
+            <a:r>
+              <a:rPr lang="en-US" sz="2400" dirty="0" smtClean="0"/>
+              <a:t>: </a:t>
+            </a:r>
+            <a:r>
+              <a:rPr lang="en-US" sz="2400" dirty="0" err="1" smtClean="0"/>
+              <a:t>tạo</a:t>
+            </a:r>
+            <a:r>
+              <a:rPr lang="en-US" sz="2400" dirty="0" smtClean="0"/>
+              <a:t> </a:t>
+            </a:r>
+            <a:r>
+              <a:rPr lang="en-US" sz="2400" dirty="0" err="1" smtClean="0"/>
+              <a:t>thư</a:t>
+            </a:r>
+            <a:r>
+              <a:rPr lang="en-US" sz="2400" dirty="0" smtClean="0"/>
+              <a:t> </a:t>
+            </a:r>
+            <a:r>
+              <a:rPr lang="en-US" sz="2400" dirty="0" err="1" smtClean="0"/>
+              <a:t>mục</a:t>
+            </a:r>
+            <a:r>
+              <a:rPr lang="en-US" sz="2400" dirty="0" smtClean="0"/>
+              <a:t> </a:t>
+            </a:r>
+            <a:r>
+              <a:rPr lang="en-US" sz="2400" dirty="0" err="1" smtClean="0"/>
+              <a:t>mới</a:t>
+            </a:r>
+            <a:r>
+              <a:rPr lang="en-US" sz="2400" dirty="0" smtClean="0"/>
+              <a:t> </a:t>
+            </a:r>
+            <a:r>
+              <a:rPr lang="en-US" sz="2400" dirty="0" err="1" smtClean="0"/>
+              <a:t>tên</a:t>
+            </a:r>
+            <a:r>
+              <a:rPr lang="en-US" sz="2400" dirty="0" smtClean="0"/>
+              <a:t> </a:t>
+            </a:r>
+            <a:r>
+              <a:rPr lang="en-US" sz="2400" dirty="0" err="1" smtClean="0"/>
+              <a:t>abc</a:t>
+            </a:r>
+            <a:endParaRPr lang="en-US" sz="2400" dirty="0" smtClean="0"/>
+          </a:p>
+          <a:p>
+            <a:endParaRPr lang="en-US" sz="2400" dirty="0" smtClean="0"/>
+          </a:p>
+        </p:txBody>
+      </p:sp>
+    </p:spTree>
+    <p:extLst>
+      <p:ext uri="{BB962C8B-B14F-4D97-AF65-F5344CB8AC3E}">
+        <p14:creationId xmlns:p14="http://schemas.microsoft.com/office/powerpoint/2010/main" val="101672575"/>
+      </p:ext>
+    </p:extLst>
+  </p:cSld>
+  <p:clrMapOvr>
+    <a:masterClrMapping/>
+  </p:clrMapOvr>
+  <p:timing>
+    <p:tnLst>
+      <p:par>
+        <p:cTn id="1" dur="indefinite" restart="never" nodeType="tmRoot"/>
+      </p:par>
+    </p:tnLst>
+  </p:timing>
+</p:sld>
+</file>
+
+<file path=ppt/slides/slide4.xml><?xml version="1.0" encoding="utf-8"?>
+<p:sld xmlns:a="http://schemas.openxmlformats.org/drawingml/2006/main" xmlns:r="http://schemas.openxmlformats.org/officeDocument/2006/relationships" xmlns:p="http://schemas.openxmlformats.org/presentationml/2006/main">
+  <p:cSld>
+    <p:spTree>
+      <p:nvGrpSpPr>
+        <p:cNvPr id="1" name=""/>
+        <p:cNvGrpSpPr/>
+        <p:nvPr/>
+      </p:nvGrpSpPr>
+      <p:grpSpPr>
+        <a:xfrm>
+          <a:off x="0" y="0"/>
+          <a:ext cx="0" cy="0"/>
+          <a:chOff x="0" y="0"/>
+          <a:chExt cx="0" cy="0"/>
+        </a:xfrm>
+      </p:grpSpPr>
+      <p:cxnSp>
+        <p:nvCxnSpPr>
+          <p:cNvPr id="6" name="Straight Connector 5"/>
+          <p:cNvCxnSpPr/>
+          <p:nvPr/>
+        </p:nvCxnSpPr>
+        <p:spPr>
+          <a:xfrm>
+            <a:off x="420907" y="6517696"/>
+            <a:ext cx="11430000" cy="0"/>
+          </a:xfrm>
+          <a:prstGeom prst="line">
+            <a:avLst/>
+          </a:prstGeom>
+        </p:spPr>
+        <p:style>
+          <a:lnRef idx="1">
+            <a:schemeClr val="accent1"/>
+          </a:lnRef>
+          <a:fillRef idx="0">
+            <a:schemeClr val="accent1"/>
+          </a:fillRef>
+          <a:effectRef idx="0">
+            <a:schemeClr val="accent1"/>
+          </a:effectRef>
+          <a:fontRef idx="minor">
+            <a:schemeClr val="tx1"/>
+          </a:fontRef>
+        </p:style>
+      </p:cxnSp>
+      <p:sp>
+        <p:nvSpPr>
+          <p:cNvPr id="5" name="Date Placeholder 4"/>
+          <p:cNvSpPr>
+            <a:spLocks noGrp="1"/>
+          </p:cNvSpPr>
+          <p:nvPr>
+            <p:ph type="dt" sz="half" idx="10"/>
+          </p:nvPr>
+        </p:nvSpPr>
+        <p:spPr>
+          <a:xfrm>
+            <a:off x="348328" y="6492875"/>
+            <a:ext cx="2743200" cy="365124"/>
+          </a:xfrm>
+        </p:spPr>
+        <p:txBody>
+          <a:bodyPr/>
+          <a:lstStyle/>
+          <a:p>
+            <a:fld id="{584BC27B-D6E5-4158-AEF2-1A466C5D5036}" type="datetime1">
+              <a:rPr lang="en-US" b="1" smtClean="0">
+                <a:solidFill>
+                  <a:srgbClr val="00B050"/>
+                </a:solidFill>
+                <a:latin typeface="Cambria" panose="02040503050406030204" pitchFamily="18" charset="0"/>
+                <a:ea typeface="Cambria" panose="02040503050406030204" pitchFamily="18" charset="0"/>
+              </a:rPr>
+              <a:t>10/3/2020</a:t>
+            </a:fld>
+            <a:endParaRPr lang="en-US" b="1" dirty="0">
+              <a:solidFill>
+                <a:srgbClr val="00B050"/>
+              </a:solidFill>
+              <a:latin typeface="Cambria" panose="02040503050406030204" pitchFamily="18" charset="0"/>
+              <a:ea typeface="Cambria" panose="02040503050406030204" pitchFamily="18" charset="0"/>
+            </a:endParaRPr>
+          </a:p>
+        </p:txBody>
+      </p:sp>
+      <p:sp>
+        <p:nvSpPr>
+          <p:cNvPr id="7" name="Footer Placeholder 6"/>
+          <p:cNvSpPr>
+            <a:spLocks noGrp="1"/>
+          </p:cNvSpPr>
+          <p:nvPr>
+            <p:ph type="ftr" sz="quarter" idx="11"/>
+          </p:nvPr>
+        </p:nvSpPr>
+        <p:spPr>
+          <a:xfrm>
+            <a:off x="9739086" y="6516914"/>
+            <a:ext cx="2184399" cy="341086"/>
+          </a:xfrm>
+        </p:spPr>
+        <p:txBody>
+          <a:bodyPr/>
+          <a:lstStyle/>
+          <a:p>
+            <a:pPr algn="r"/>
+            <a:r>
+              <a:rPr lang="en-US" b="1" dirty="0" err="1" smtClean="0">
+                <a:solidFill>
+                  <a:srgbClr val="00B050"/>
+                </a:solidFill>
+                <a:latin typeface="Cambria" panose="02040503050406030204" pitchFamily="18" charset="0"/>
+                <a:ea typeface="Cambria" panose="02040503050406030204" pitchFamily="18" charset="0"/>
+              </a:rPr>
+              <a:t>Tuấn</a:t>
+            </a:r>
+            <a:r>
+              <a:rPr lang="en-US" b="1" dirty="0" smtClean="0">
+                <a:solidFill>
+                  <a:srgbClr val="00B050"/>
+                </a:solidFill>
+                <a:latin typeface="Cambria" panose="02040503050406030204" pitchFamily="18" charset="0"/>
+                <a:ea typeface="Cambria" panose="02040503050406030204" pitchFamily="18" charset="0"/>
+              </a:rPr>
+              <a:t> Khoa</a:t>
+            </a:r>
+            <a:endParaRPr lang="en-US" b="1" dirty="0">
+              <a:solidFill>
+                <a:srgbClr val="00B050"/>
+              </a:solidFill>
+              <a:latin typeface="Cambria" panose="02040503050406030204" pitchFamily="18" charset="0"/>
+              <a:ea typeface="Cambria" panose="02040503050406030204" pitchFamily="18" charset="0"/>
+            </a:endParaRPr>
+          </a:p>
+        </p:txBody>
+      </p:sp>
+      <p:sp>
+        <p:nvSpPr>
+          <p:cNvPr id="8" name="Slide Number Placeholder 7"/>
+          <p:cNvSpPr>
+            <a:spLocks noGrp="1"/>
+          </p:cNvSpPr>
+          <p:nvPr>
+            <p:ph type="sldNum" sz="quarter" idx="12"/>
+          </p:nvPr>
+        </p:nvSpPr>
+        <p:spPr>
+          <a:xfrm>
+            <a:off x="4764307" y="6542518"/>
+            <a:ext cx="2743200" cy="315481"/>
+          </a:xfrm>
+        </p:spPr>
+        <p:txBody>
+          <a:bodyPr/>
+          <a:lstStyle/>
+          <a:p>
+            <a:pPr algn="ctr"/>
+            <a:fld id="{CEE3C117-CD36-4311-9030-17CD772F032C}" type="slidenum">
+              <a:rPr lang="en-US" b="1" smtClean="0">
+                <a:solidFill>
+                  <a:srgbClr val="00B050"/>
+                </a:solidFill>
+                <a:latin typeface="Cambria" panose="02040503050406030204" pitchFamily="18" charset="0"/>
+                <a:ea typeface="Cambria" panose="02040503050406030204" pitchFamily="18" charset="0"/>
+              </a:rPr>
+              <a:pPr algn="ctr"/>
+              <a:t>4</a:t>
+            </a:fld>
+            <a:endParaRPr lang="en-US" b="1" dirty="0">
+              <a:solidFill>
+                <a:srgbClr val="00B050"/>
+              </a:solidFill>
+              <a:latin typeface="Cambria" panose="02040503050406030204" pitchFamily="18" charset="0"/>
+              <a:ea typeface="Cambria" panose="02040503050406030204" pitchFamily="18" charset="0"/>
+            </a:endParaRPr>
+          </a:p>
+        </p:txBody>
+      </p:sp>
+      <p:sp>
+        <p:nvSpPr>
+          <p:cNvPr id="2" name="TextBox 1"/>
+          <p:cNvSpPr txBox="1"/>
+          <p:nvPr/>
+        </p:nvSpPr>
+        <p:spPr>
+          <a:xfrm>
+            <a:off x="551529" y="203198"/>
+            <a:ext cx="11502578" cy="584775"/>
+          </a:xfrm>
+          <a:prstGeom prst="rect">
+            <a:avLst/>
+          </a:prstGeom>
+          <a:noFill/>
+        </p:spPr>
+        <p:txBody>
+          <a:bodyPr wrap="square" rtlCol="0">
+            <a:spAutoFit/>
+          </a:bodyPr>
+          <a:lstStyle/>
+          <a:p>
+            <a:r>
+              <a:rPr lang="en-US" sz="3200" b="1" dirty="0" err="1" smtClean="0">
+                <a:solidFill>
+                  <a:srgbClr val="0070C0"/>
+                </a:solidFill>
+                <a:ea typeface="Cambria" panose="02040503050406030204" pitchFamily="18" charset="0"/>
+              </a:rPr>
+              <a:t>Các</a:t>
+            </a:r>
+            <a:r>
+              <a:rPr lang="en-US" sz="3200" b="1" dirty="0" smtClean="0">
+                <a:solidFill>
+                  <a:srgbClr val="0070C0"/>
+                </a:solidFill>
+                <a:ea typeface="Cambria" panose="02040503050406030204" pitchFamily="18" charset="0"/>
+              </a:rPr>
+              <a:t> </a:t>
+            </a:r>
+            <a:r>
+              <a:rPr lang="en-US" sz="3200" b="1" dirty="0" err="1" smtClean="0">
+                <a:solidFill>
+                  <a:srgbClr val="0070C0"/>
+                </a:solidFill>
+                <a:ea typeface="Cambria" panose="02040503050406030204" pitchFamily="18" charset="0"/>
+              </a:rPr>
+              <a:t>lệnh</a:t>
+            </a:r>
+            <a:r>
+              <a:rPr lang="en-US" sz="3200" b="1" dirty="0" smtClean="0">
+                <a:solidFill>
+                  <a:srgbClr val="0070C0"/>
+                </a:solidFill>
+                <a:ea typeface="Cambria" panose="02040503050406030204" pitchFamily="18" charset="0"/>
+              </a:rPr>
+              <a:t> </a:t>
+            </a:r>
+            <a:r>
+              <a:rPr lang="en-US" sz="3200" b="1" dirty="0" err="1" smtClean="0">
+                <a:solidFill>
+                  <a:srgbClr val="0070C0"/>
+                </a:solidFill>
+                <a:ea typeface="Cambria" panose="02040503050406030204" pitchFamily="18" charset="0"/>
+              </a:rPr>
+              <a:t>cơ</a:t>
+            </a:r>
+            <a:r>
+              <a:rPr lang="en-US" sz="3200" b="1" dirty="0" smtClean="0">
+                <a:solidFill>
+                  <a:srgbClr val="0070C0"/>
+                </a:solidFill>
+                <a:ea typeface="Cambria" panose="02040503050406030204" pitchFamily="18" charset="0"/>
+              </a:rPr>
+              <a:t> </a:t>
+            </a:r>
+            <a:r>
+              <a:rPr lang="en-US" sz="3200" b="1" dirty="0" err="1" smtClean="0">
+                <a:solidFill>
+                  <a:srgbClr val="0070C0"/>
+                </a:solidFill>
+                <a:ea typeface="Cambria" panose="02040503050406030204" pitchFamily="18" charset="0"/>
+              </a:rPr>
+              <a:t>bản</a:t>
+            </a:r>
+            <a:endParaRPr lang="en-US" sz="3200" b="1" dirty="0">
+              <a:solidFill>
+                <a:srgbClr val="0070C0"/>
+              </a:solidFill>
+              <a:ea typeface="Cambria" panose="02040503050406030204" pitchFamily="18" charset="0"/>
+            </a:endParaRPr>
+          </a:p>
+        </p:txBody>
+      </p:sp>
+      <p:cxnSp>
+        <p:nvCxnSpPr>
+          <p:cNvPr id="4" name="Straight Connector 3"/>
+          <p:cNvCxnSpPr/>
+          <p:nvPr/>
+        </p:nvCxnSpPr>
+        <p:spPr>
+          <a:xfrm flipV="1">
+            <a:off x="624107" y="769961"/>
+            <a:ext cx="2743200" cy="0"/>
+          </a:xfrm>
+          <a:prstGeom prst="line">
+            <a:avLst/>
+          </a:prstGeom>
+          <a:ln w="38100"/>
+        </p:spPr>
+        <p:style>
+          <a:lnRef idx="3">
+            <a:schemeClr val="accent6"/>
+          </a:lnRef>
+          <a:fillRef idx="0">
+            <a:schemeClr val="accent6"/>
+          </a:fillRef>
+          <a:effectRef idx="2">
+            <a:schemeClr val="accent6"/>
+          </a:effectRef>
+          <a:fontRef idx="minor">
+            <a:schemeClr val="tx1"/>
+          </a:fontRef>
+        </p:style>
+      </p:cxnSp>
+      <p:sp>
+        <p:nvSpPr>
+          <p:cNvPr id="3" name="TextBox 2"/>
+          <p:cNvSpPr txBox="1"/>
+          <p:nvPr/>
+        </p:nvSpPr>
+        <p:spPr>
+          <a:xfrm>
+            <a:off x="624107" y="1175657"/>
+            <a:ext cx="10871207" cy="4154984"/>
+          </a:xfrm>
+          <a:prstGeom prst="rect">
+            <a:avLst/>
+          </a:prstGeom>
+          <a:noFill/>
+        </p:spPr>
+        <p:txBody>
+          <a:bodyPr wrap="square" rtlCol="0">
+            <a:spAutoFit/>
+          </a:bodyPr>
+          <a:lstStyle/>
+          <a:p>
+            <a:pPr marL="285750" indent="-285750">
+              <a:buFont typeface="Arial" panose="020B0604020202020204" pitchFamily="34" charset="0"/>
+              <a:buChar char="•"/>
+            </a:pPr>
+            <a:r>
+              <a:rPr lang="en-US" sz="2400" dirty="0"/>
+              <a:t>Touch </a:t>
+            </a:r>
+            <a:r>
+              <a:rPr lang="en-US" sz="2400" dirty="0" err="1"/>
+              <a:t>abc</a:t>
+            </a:r>
+            <a:r>
+              <a:rPr lang="en-US" sz="2400" dirty="0"/>
+              <a:t>: </a:t>
+            </a:r>
+            <a:r>
+              <a:rPr lang="en-US" sz="2400" dirty="0" err="1"/>
+              <a:t>tạo</a:t>
+            </a:r>
+            <a:r>
+              <a:rPr lang="en-US" sz="2400" dirty="0"/>
+              <a:t> file </a:t>
+            </a:r>
+            <a:r>
+              <a:rPr lang="en-US" sz="2400" dirty="0" err="1"/>
+              <a:t>tên</a:t>
+            </a:r>
+            <a:r>
+              <a:rPr lang="en-US" sz="2400" dirty="0"/>
+              <a:t> </a:t>
+            </a:r>
+            <a:r>
+              <a:rPr lang="en-US" sz="2400" dirty="0" err="1" smtClean="0"/>
+              <a:t>abc</a:t>
+            </a:r>
+            <a:endParaRPr lang="en-US" sz="2400" dirty="0" smtClean="0"/>
+          </a:p>
+          <a:p>
+            <a:pPr marL="285750" indent="-285750">
+              <a:buFont typeface="Arial" panose="020B0604020202020204" pitchFamily="34" charset="0"/>
+              <a:buChar char="•"/>
+            </a:pPr>
+            <a:endParaRPr lang="en-US" sz="2400" dirty="0"/>
+          </a:p>
+          <a:p>
+            <a:pPr marL="285750" indent="-285750">
+              <a:buFont typeface="Arial" panose="020B0604020202020204" pitchFamily="34" charset="0"/>
+              <a:buChar char="•"/>
+            </a:pPr>
+            <a:r>
+              <a:rPr lang="en-US" sz="2400" dirty="0"/>
+              <a:t>Nano </a:t>
+            </a:r>
+            <a:r>
+              <a:rPr lang="en-US" sz="2400" dirty="0" err="1"/>
+              <a:t>abc</a:t>
+            </a:r>
+            <a:r>
+              <a:rPr lang="en-US" sz="2400" dirty="0"/>
+              <a:t>: </a:t>
+            </a:r>
+            <a:r>
+              <a:rPr lang="en-US" sz="2400" dirty="0" err="1"/>
+              <a:t>mở</a:t>
+            </a:r>
+            <a:r>
+              <a:rPr lang="en-US" sz="2400" dirty="0"/>
+              <a:t> file </a:t>
+            </a:r>
+            <a:r>
+              <a:rPr lang="en-US" sz="2400" dirty="0" err="1" smtClean="0"/>
+              <a:t>abc</a:t>
+            </a:r>
+            <a:endParaRPr lang="en-US" sz="2400" dirty="0" smtClean="0"/>
+          </a:p>
+          <a:p>
+            <a:pPr marL="285750" indent="-285750">
+              <a:buFont typeface="Arial" panose="020B0604020202020204" pitchFamily="34" charset="0"/>
+              <a:buChar char="•"/>
+            </a:pPr>
+            <a:endParaRPr lang="en-US" sz="2400" dirty="0"/>
+          </a:p>
+          <a:p>
+            <a:pPr marL="285750" indent="-285750">
+              <a:buFont typeface="Arial" panose="020B0604020202020204" pitchFamily="34" charset="0"/>
+              <a:buChar char="•"/>
+            </a:pPr>
+            <a:r>
+              <a:rPr lang="en-US" sz="2400" dirty="0"/>
+              <a:t>Vim -&gt; </a:t>
+            </a:r>
+            <a:r>
+              <a:rPr lang="en-US" sz="2400" dirty="0" err="1"/>
+              <a:t>sẽ</a:t>
+            </a:r>
+            <a:r>
+              <a:rPr lang="en-US" sz="2400" dirty="0"/>
+              <a:t> </a:t>
+            </a:r>
+            <a:r>
+              <a:rPr lang="en-US" sz="2400" dirty="0" err="1"/>
+              <a:t>nói</a:t>
+            </a:r>
+            <a:r>
+              <a:rPr lang="en-US" sz="2400" dirty="0"/>
+              <a:t> ở </a:t>
+            </a:r>
+            <a:r>
+              <a:rPr lang="en-US" sz="2400" dirty="0" err="1"/>
+              <a:t>phần</a:t>
+            </a:r>
+            <a:r>
+              <a:rPr lang="en-US" sz="2400" dirty="0"/>
+              <a:t> </a:t>
+            </a:r>
+            <a:r>
+              <a:rPr lang="en-US" sz="2400" dirty="0" err="1" smtClean="0"/>
+              <a:t>sau</a:t>
+            </a:r>
+            <a:endParaRPr lang="en-US" sz="2400" dirty="0" smtClean="0"/>
+          </a:p>
+          <a:p>
+            <a:pPr marL="285750" indent="-285750">
+              <a:buFont typeface="Arial" panose="020B0604020202020204" pitchFamily="34" charset="0"/>
+              <a:buChar char="•"/>
+            </a:pPr>
+            <a:endParaRPr lang="en-US" sz="2400" dirty="0"/>
+          </a:p>
+          <a:p>
+            <a:pPr marL="285750" indent="-285750">
+              <a:buFont typeface="Arial" panose="020B0604020202020204" pitchFamily="34" charset="0"/>
+              <a:buChar char="•"/>
+            </a:pPr>
+            <a:r>
+              <a:rPr lang="en-US" sz="2400" dirty="0"/>
+              <a:t>Rm </a:t>
+            </a:r>
+            <a:r>
+              <a:rPr lang="en-US" sz="2400" dirty="0" err="1"/>
+              <a:t>abc</a:t>
+            </a:r>
+            <a:r>
+              <a:rPr lang="en-US" sz="2400" dirty="0"/>
+              <a:t>: </a:t>
+            </a:r>
+            <a:r>
+              <a:rPr lang="en-US" sz="2400" dirty="0" err="1"/>
+              <a:t>xóa</a:t>
+            </a:r>
+            <a:r>
+              <a:rPr lang="en-US" sz="2400" dirty="0"/>
+              <a:t> file </a:t>
+            </a:r>
+            <a:r>
+              <a:rPr lang="en-US" sz="2400" dirty="0" err="1"/>
+              <a:t>abc</a:t>
+            </a:r>
+            <a:r>
+              <a:rPr lang="en-US" sz="2400" dirty="0"/>
+              <a:t> (</a:t>
+            </a:r>
+            <a:r>
+              <a:rPr lang="en-US" sz="2400" dirty="0" err="1"/>
+              <a:t>rm</a:t>
+            </a:r>
+            <a:r>
+              <a:rPr lang="en-US" sz="2400" dirty="0"/>
+              <a:t> *.</a:t>
+            </a:r>
+            <a:r>
+              <a:rPr lang="en-US" sz="2400" dirty="0" err="1"/>
+              <a:t>js</a:t>
+            </a:r>
+            <a:r>
+              <a:rPr lang="en-US" sz="2400" dirty="0"/>
+              <a:t> –&gt; </a:t>
+            </a:r>
+            <a:r>
+              <a:rPr lang="en-US" sz="2400" dirty="0" err="1"/>
+              <a:t>xóa</a:t>
+            </a:r>
+            <a:r>
+              <a:rPr lang="en-US" sz="2400" dirty="0"/>
+              <a:t> </a:t>
+            </a:r>
+            <a:r>
+              <a:rPr lang="en-US" sz="2400" dirty="0" err="1"/>
+              <a:t>toàn</a:t>
+            </a:r>
+            <a:r>
+              <a:rPr lang="en-US" sz="2400" dirty="0"/>
+              <a:t> </a:t>
+            </a:r>
+            <a:r>
+              <a:rPr lang="en-US" sz="2400" dirty="0" err="1"/>
+              <a:t>bộ</a:t>
+            </a:r>
+            <a:r>
+              <a:rPr lang="en-US" sz="2400" dirty="0"/>
+              <a:t> file </a:t>
+            </a:r>
+            <a:r>
+              <a:rPr lang="en-US" sz="2400" dirty="0" err="1"/>
+              <a:t>đuôi</a:t>
+            </a:r>
+            <a:r>
+              <a:rPr lang="en-US" sz="2400" dirty="0"/>
+              <a:t> .</a:t>
+            </a:r>
+            <a:r>
+              <a:rPr lang="en-US" sz="2400" dirty="0" err="1"/>
+              <a:t>js</a:t>
+            </a:r>
+            <a:r>
+              <a:rPr lang="en-US" sz="2400" dirty="0" smtClean="0"/>
+              <a:t>)</a:t>
+            </a:r>
+          </a:p>
+          <a:p>
+            <a:pPr marL="285750" indent="-285750">
+              <a:buFont typeface="Arial" panose="020B0604020202020204" pitchFamily="34" charset="0"/>
+              <a:buChar char="•"/>
+            </a:pPr>
+            <a:endParaRPr lang="en-US" sz="2400" dirty="0"/>
+          </a:p>
+          <a:p>
+            <a:pPr marL="285750" indent="-285750">
+              <a:buFont typeface="Arial" panose="020B0604020202020204" pitchFamily="34" charset="0"/>
+              <a:buChar char="•"/>
+            </a:pPr>
+            <a:r>
+              <a:rPr lang="en-US" sz="2400" dirty="0"/>
+              <a:t>Cat </a:t>
+            </a:r>
+            <a:r>
+              <a:rPr lang="en-US" sz="2400" dirty="0" err="1"/>
+              <a:t>abc</a:t>
+            </a:r>
+            <a:r>
+              <a:rPr lang="en-US" sz="2400" dirty="0"/>
+              <a:t>: </a:t>
+            </a:r>
+            <a:r>
+              <a:rPr lang="en-US" sz="2400" dirty="0" err="1"/>
+              <a:t>đọc</a:t>
+            </a:r>
+            <a:r>
+              <a:rPr lang="en-US" sz="2400" dirty="0"/>
+              <a:t> file </a:t>
+            </a:r>
+            <a:r>
+              <a:rPr lang="en-US" sz="2400" dirty="0" err="1" smtClean="0"/>
+              <a:t>abc</a:t>
+            </a:r>
+            <a:endParaRPr lang="en-US" sz="2400" dirty="0" smtClean="0"/>
+          </a:p>
+          <a:p>
+            <a:pPr marL="285750" indent="-285750">
+              <a:buFont typeface="Arial" panose="020B0604020202020204" pitchFamily="34" charset="0"/>
+              <a:buChar char="•"/>
+            </a:pPr>
+            <a:endParaRPr lang="en-US" sz="2400" dirty="0"/>
+          </a:p>
+          <a:p>
+            <a:pPr marL="285750" indent="-285750">
+              <a:buFont typeface="Arial" panose="020B0604020202020204" pitchFamily="34" charset="0"/>
+              <a:buChar char="•"/>
+            </a:pPr>
+            <a:r>
+              <a:rPr lang="en-US" sz="2400" dirty="0" err="1"/>
+              <a:t>Cp</a:t>
+            </a:r>
+            <a:r>
+              <a:rPr lang="en-US" sz="2400" dirty="0"/>
+              <a:t> </a:t>
+            </a:r>
+            <a:r>
+              <a:rPr lang="en-US" sz="2400" dirty="0" err="1"/>
+              <a:t>mno</a:t>
+            </a:r>
+            <a:r>
+              <a:rPr lang="en-US" sz="2400" dirty="0"/>
+              <a:t>/</a:t>
+            </a:r>
+            <a:r>
+              <a:rPr lang="en-US" sz="2400" dirty="0" err="1"/>
+              <a:t>acb</a:t>
+            </a:r>
+            <a:r>
+              <a:rPr lang="en-US" sz="2400" dirty="0"/>
+              <a:t> /xyz: copy file </a:t>
+            </a:r>
+            <a:r>
+              <a:rPr lang="en-US" sz="2400" dirty="0" err="1"/>
+              <a:t>abc</a:t>
+            </a:r>
+            <a:r>
+              <a:rPr lang="en-US" sz="2400" dirty="0"/>
+              <a:t> </a:t>
+            </a:r>
+            <a:r>
+              <a:rPr lang="en-US" sz="2400" dirty="0" err="1"/>
+              <a:t>trong</a:t>
+            </a:r>
+            <a:r>
+              <a:rPr lang="en-US" sz="2400" dirty="0"/>
+              <a:t> </a:t>
+            </a:r>
+            <a:r>
+              <a:rPr lang="en-US" sz="2400" dirty="0" err="1"/>
+              <a:t>thư</a:t>
+            </a:r>
+            <a:r>
+              <a:rPr lang="en-US" sz="2400" dirty="0"/>
+              <a:t> </a:t>
+            </a:r>
+            <a:r>
+              <a:rPr lang="en-US" sz="2400" dirty="0" err="1"/>
+              <a:t>mục</a:t>
+            </a:r>
+            <a:r>
+              <a:rPr lang="en-US" sz="2400" dirty="0"/>
+              <a:t> </a:t>
+            </a:r>
+            <a:r>
+              <a:rPr lang="en-US" sz="2400" dirty="0" err="1"/>
+              <a:t>mno</a:t>
+            </a:r>
+            <a:r>
+              <a:rPr lang="en-US" sz="2400" dirty="0"/>
+              <a:t> </a:t>
+            </a:r>
+            <a:r>
+              <a:rPr lang="en-US" sz="2400" dirty="0" err="1"/>
+              <a:t>đến</a:t>
+            </a:r>
+            <a:r>
+              <a:rPr lang="en-US" sz="2400" dirty="0"/>
+              <a:t> </a:t>
+            </a:r>
+            <a:r>
+              <a:rPr lang="en-US" sz="2400" dirty="0" err="1"/>
+              <a:t>thư</a:t>
+            </a:r>
+            <a:r>
+              <a:rPr lang="en-US" sz="2400" dirty="0"/>
+              <a:t> </a:t>
+            </a:r>
+            <a:r>
+              <a:rPr lang="en-US" sz="2400" dirty="0" err="1"/>
+              <a:t>mục</a:t>
+            </a:r>
+            <a:r>
+              <a:rPr lang="en-US" sz="2400" dirty="0"/>
+              <a:t> </a:t>
+            </a:r>
+            <a:r>
+              <a:rPr lang="en-US" sz="2400" dirty="0" smtClean="0"/>
+              <a:t>xyz</a:t>
+            </a:r>
+            <a:endParaRPr lang="en-US" sz="2400" dirty="0"/>
+          </a:p>
+        </p:txBody>
+      </p:sp>
+    </p:spTree>
+    <p:extLst>
+      <p:ext uri="{BB962C8B-B14F-4D97-AF65-F5344CB8AC3E}">
+        <p14:creationId xmlns:p14="http://schemas.microsoft.com/office/powerpoint/2010/main" val="769140404"/>
+      </p:ext>
+    </p:extLst>
+  </p:cSld>
+  <p:clrMapOvr>
+    <a:masterClrMapping/>
+  </p:clrMapOvr>
+  <p:timing>
+    <p:tnLst>
+      <p:par>
+        <p:cTn id="1" dur="indefinite" restart="never" nodeType="tmRoot"/>
+      </p:par>
+    </p:tnLst>
+  </p:timing>
+</p:sld>
+</file>
+
+<file path=ppt/slides/slide5.xml><?xml version="1.0" encoding="utf-8"?>
+<p:sld xmlns:a="http://schemas.openxmlformats.org/drawingml/2006/main" xmlns:r="http://schemas.openxmlformats.org/officeDocument/2006/relationships" xmlns:p="http://schemas.openxmlformats.org/presentationml/2006/main">
+  <p:cSld>
+    <p:spTree>
+      <p:nvGrpSpPr>
+        <p:cNvPr id="1" name=""/>
+        <p:cNvGrpSpPr/>
+        <p:nvPr/>
+      </p:nvGrpSpPr>
+      <p:grpSpPr>
+        <a:xfrm>
+          <a:off x="0" y="0"/>
+          <a:ext cx="0" cy="0"/>
+          <a:chOff x="0" y="0"/>
+          <a:chExt cx="0" cy="0"/>
+        </a:xfrm>
+      </p:grpSpPr>
+      <p:cxnSp>
+        <p:nvCxnSpPr>
+          <p:cNvPr id="6" name="Straight Connector 5"/>
+          <p:cNvCxnSpPr/>
+          <p:nvPr/>
+        </p:nvCxnSpPr>
+        <p:spPr>
+          <a:xfrm>
+            <a:off x="420907" y="6517696"/>
+            <a:ext cx="11430000" cy="0"/>
+          </a:xfrm>
+          <a:prstGeom prst="line">
+            <a:avLst/>
+          </a:prstGeom>
+        </p:spPr>
+        <p:style>
+          <a:lnRef idx="1">
+            <a:schemeClr val="accent1"/>
+          </a:lnRef>
+          <a:fillRef idx="0">
+            <a:schemeClr val="accent1"/>
+          </a:fillRef>
+          <a:effectRef idx="0">
+            <a:schemeClr val="accent1"/>
+          </a:effectRef>
+          <a:fontRef idx="minor">
+            <a:schemeClr val="tx1"/>
+          </a:fontRef>
+        </p:style>
+      </p:cxnSp>
+      <p:sp>
+        <p:nvSpPr>
+          <p:cNvPr id="5" name="Date Placeholder 4"/>
+          <p:cNvSpPr>
+            <a:spLocks noGrp="1"/>
+          </p:cNvSpPr>
+          <p:nvPr>
+            <p:ph type="dt" sz="half" idx="10"/>
+          </p:nvPr>
+        </p:nvSpPr>
+        <p:spPr>
+          <a:xfrm>
+            <a:off x="348328" y="6492875"/>
+            <a:ext cx="2743200" cy="365124"/>
+          </a:xfrm>
+        </p:spPr>
+        <p:txBody>
+          <a:bodyPr/>
+          <a:lstStyle/>
+          <a:p>
+            <a:fld id="{584BC27B-D6E5-4158-AEF2-1A466C5D5036}" type="datetime1">
+              <a:rPr lang="en-US" b="1" smtClean="0">
+                <a:solidFill>
+                  <a:srgbClr val="00B050"/>
+                </a:solidFill>
+                <a:latin typeface="Cambria" panose="02040503050406030204" pitchFamily="18" charset="0"/>
+                <a:ea typeface="Cambria" panose="02040503050406030204" pitchFamily="18" charset="0"/>
+              </a:rPr>
+              <a:t>10/3/2020</a:t>
+            </a:fld>
+            <a:endParaRPr lang="en-US" b="1" dirty="0">
+              <a:solidFill>
+                <a:srgbClr val="00B050"/>
+              </a:solidFill>
+              <a:latin typeface="Cambria" panose="02040503050406030204" pitchFamily="18" charset="0"/>
+              <a:ea typeface="Cambria" panose="02040503050406030204" pitchFamily="18" charset="0"/>
+            </a:endParaRPr>
+          </a:p>
+        </p:txBody>
+      </p:sp>
+      <p:sp>
+        <p:nvSpPr>
+          <p:cNvPr id="7" name="Footer Placeholder 6"/>
+          <p:cNvSpPr>
+            <a:spLocks noGrp="1"/>
+          </p:cNvSpPr>
+          <p:nvPr>
+            <p:ph type="ftr" sz="quarter" idx="11"/>
+          </p:nvPr>
+        </p:nvSpPr>
+        <p:spPr>
+          <a:xfrm>
+            <a:off x="9739086" y="6516914"/>
+            <a:ext cx="2184399" cy="341086"/>
+          </a:xfrm>
+        </p:spPr>
+        <p:txBody>
+          <a:bodyPr/>
+          <a:lstStyle/>
+          <a:p>
+            <a:pPr algn="r"/>
+            <a:r>
+              <a:rPr lang="en-US" b="1" dirty="0" err="1" smtClean="0">
+                <a:solidFill>
+                  <a:srgbClr val="00B050"/>
+                </a:solidFill>
+                <a:latin typeface="Cambria" panose="02040503050406030204" pitchFamily="18" charset="0"/>
+                <a:ea typeface="Cambria" panose="02040503050406030204" pitchFamily="18" charset="0"/>
+              </a:rPr>
+              <a:t>Tuấn</a:t>
+            </a:r>
+            <a:r>
+              <a:rPr lang="en-US" b="1" dirty="0" smtClean="0">
+                <a:solidFill>
+                  <a:srgbClr val="00B050"/>
+                </a:solidFill>
+                <a:latin typeface="Cambria" panose="02040503050406030204" pitchFamily="18" charset="0"/>
+                <a:ea typeface="Cambria" panose="02040503050406030204" pitchFamily="18" charset="0"/>
+              </a:rPr>
+              <a:t> Khoa</a:t>
+            </a:r>
+            <a:endParaRPr lang="en-US" b="1" dirty="0">
+              <a:solidFill>
+                <a:srgbClr val="00B050"/>
+              </a:solidFill>
+              <a:latin typeface="Cambria" panose="02040503050406030204" pitchFamily="18" charset="0"/>
+              <a:ea typeface="Cambria" panose="02040503050406030204" pitchFamily="18" charset="0"/>
+            </a:endParaRPr>
+          </a:p>
+        </p:txBody>
+      </p:sp>
+      <p:sp>
+        <p:nvSpPr>
+          <p:cNvPr id="8" name="Slide Number Placeholder 7"/>
+          <p:cNvSpPr>
+            <a:spLocks noGrp="1"/>
+          </p:cNvSpPr>
+          <p:nvPr>
+            <p:ph type="sldNum" sz="quarter" idx="12"/>
+          </p:nvPr>
+        </p:nvSpPr>
+        <p:spPr>
+          <a:xfrm>
+            <a:off x="4764307" y="6542518"/>
+            <a:ext cx="2743200" cy="315481"/>
+          </a:xfrm>
+        </p:spPr>
+        <p:txBody>
+          <a:bodyPr/>
+          <a:lstStyle/>
+          <a:p>
+            <a:pPr algn="ctr"/>
+            <a:fld id="{CEE3C117-CD36-4311-9030-17CD772F032C}" type="slidenum">
+              <a:rPr lang="en-US" b="1" smtClean="0">
+                <a:solidFill>
+                  <a:srgbClr val="00B050"/>
+                </a:solidFill>
+                <a:latin typeface="Cambria" panose="02040503050406030204" pitchFamily="18" charset="0"/>
+                <a:ea typeface="Cambria" panose="02040503050406030204" pitchFamily="18" charset="0"/>
+              </a:rPr>
+              <a:pPr algn="ctr"/>
+              <a:t>5</a:t>
+            </a:fld>
+            <a:endParaRPr lang="en-US" b="1" dirty="0">
+              <a:solidFill>
+                <a:srgbClr val="00B050"/>
+              </a:solidFill>
+              <a:latin typeface="Cambria" panose="02040503050406030204" pitchFamily="18" charset="0"/>
+              <a:ea typeface="Cambria" panose="02040503050406030204" pitchFamily="18" charset="0"/>
+            </a:endParaRPr>
+          </a:p>
+        </p:txBody>
+      </p:sp>
+      <p:sp>
+        <p:nvSpPr>
+          <p:cNvPr id="2" name="TextBox 1"/>
+          <p:cNvSpPr txBox="1"/>
+          <p:nvPr/>
+        </p:nvSpPr>
+        <p:spPr>
+          <a:xfrm>
+            <a:off x="551529" y="203198"/>
+            <a:ext cx="11502578" cy="584775"/>
+          </a:xfrm>
+          <a:prstGeom prst="rect">
+            <a:avLst/>
+          </a:prstGeom>
+          <a:noFill/>
+        </p:spPr>
+        <p:txBody>
+          <a:bodyPr wrap="square" rtlCol="0">
+            <a:spAutoFit/>
+          </a:bodyPr>
+          <a:lstStyle/>
+          <a:p>
+            <a:r>
+              <a:rPr lang="en-US" sz="3200" b="1" dirty="0" err="1" smtClean="0">
+                <a:solidFill>
+                  <a:srgbClr val="0070C0"/>
+                </a:solidFill>
+                <a:ea typeface="Cambria" panose="02040503050406030204" pitchFamily="18" charset="0"/>
+              </a:rPr>
+              <a:t>Các</a:t>
+            </a:r>
+            <a:r>
+              <a:rPr lang="en-US" sz="3200" b="1" dirty="0" smtClean="0">
+                <a:solidFill>
+                  <a:srgbClr val="0070C0"/>
+                </a:solidFill>
+                <a:ea typeface="Cambria" panose="02040503050406030204" pitchFamily="18" charset="0"/>
+              </a:rPr>
+              <a:t> </a:t>
+            </a:r>
+            <a:r>
+              <a:rPr lang="en-US" sz="3200" b="1" dirty="0" err="1" smtClean="0">
+                <a:solidFill>
+                  <a:srgbClr val="0070C0"/>
+                </a:solidFill>
+                <a:ea typeface="Cambria" panose="02040503050406030204" pitchFamily="18" charset="0"/>
+              </a:rPr>
+              <a:t>lệnh</a:t>
+            </a:r>
+            <a:r>
+              <a:rPr lang="en-US" sz="3200" b="1" dirty="0" smtClean="0">
+                <a:solidFill>
+                  <a:srgbClr val="0070C0"/>
+                </a:solidFill>
+                <a:ea typeface="Cambria" panose="02040503050406030204" pitchFamily="18" charset="0"/>
+              </a:rPr>
+              <a:t> </a:t>
+            </a:r>
+            <a:r>
+              <a:rPr lang="en-US" sz="3200" b="1" dirty="0" err="1" smtClean="0">
+                <a:solidFill>
+                  <a:srgbClr val="0070C0"/>
+                </a:solidFill>
+                <a:ea typeface="Cambria" panose="02040503050406030204" pitchFamily="18" charset="0"/>
+              </a:rPr>
+              <a:t>cơ</a:t>
+            </a:r>
+            <a:r>
+              <a:rPr lang="en-US" sz="3200" b="1" dirty="0" smtClean="0">
+                <a:solidFill>
+                  <a:srgbClr val="0070C0"/>
+                </a:solidFill>
+                <a:ea typeface="Cambria" panose="02040503050406030204" pitchFamily="18" charset="0"/>
+              </a:rPr>
+              <a:t> </a:t>
+            </a:r>
+            <a:r>
+              <a:rPr lang="en-US" sz="3200" b="1" dirty="0" err="1" smtClean="0">
+                <a:solidFill>
+                  <a:srgbClr val="0070C0"/>
+                </a:solidFill>
+                <a:ea typeface="Cambria" panose="02040503050406030204" pitchFamily="18" charset="0"/>
+              </a:rPr>
+              <a:t>bản</a:t>
+            </a:r>
+            <a:endParaRPr lang="en-US" sz="3200" b="1" dirty="0">
+              <a:solidFill>
+                <a:srgbClr val="0070C0"/>
+              </a:solidFill>
+              <a:ea typeface="Cambria" panose="02040503050406030204" pitchFamily="18" charset="0"/>
+            </a:endParaRPr>
+          </a:p>
+        </p:txBody>
+      </p:sp>
+      <p:cxnSp>
+        <p:nvCxnSpPr>
+          <p:cNvPr id="4" name="Straight Connector 3"/>
+          <p:cNvCxnSpPr/>
+          <p:nvPr/>
+        </p:nvCxnSpPr>
+        <p:spPr>
+          <a:xfrm flipV="1">
+            <a:off x="624107" y="769961"/>
+            <a:ext cx="2743200" cy="0"/>
+          </a:xfrm>
+          <a:prstGeom prst="line">
+            <a:avLst/>
+          </a:prstGeom>
+          <a:ln w="38100"/>
+        </p:spPr>
+        <p:style>
+          <a:lnRef idx="3">
+            <a:schemeClr val="accent6"/>
+          </a:lnRef>
+          <a:fillRef idx="0">
+            <a:schemeClr val="accent6"/>
+          </a:fillRef>
+          <a:effectRef idx="2">
+            <a:schemeClr val="accent6"/>
+          </a:effectRef>
+          <a:fontRef idx="minor">
+            <a:schemeClr val="tx1"/>
+          </a:fontRef>
+        </p:style>
+      </p:cxnSp>
+      <p:sp>
+        <p:nvSpPr>
+          <p:cNvPr id="3" name="TextBox 2"/>
+          <p:cNvSpPr txBox="1"/>
+          <p:nvPr/>
+        </p:nvSpPr>
+        <p:spPr>
+          <a:xfrm>
+            <a:off x="624107" y="1175657"/>
+            <a:ext cx="10871207" cy="2677656"/>
+          </a:xfrm>
+          <a:prstGeom prst="rect">
+            <a:avLst/>
+          </a:prstGeom>
+          <a:noFill/>
+        </p:spPr>
+        <p:txBody>
+          <a:bodyPr wrap="square" rtlCol="0">
+            <a:spAutoFit/>
+          </a:bodyPr>
+          <a:lstStyle/>
+          <a:p>
+            <a:pPr marL="285750" indent="-285750">
+              <a:buFont typeface="Arial" panose="020B0604020202020204" pitchFamily="34" charset="0"/>
+              <a:buChar char="•"/>
+            </a:pPr>
+            <a:r>
+              <a:rPr lang="en-US" sz="2400" dirty="0" smtClean="0"/>
+              <a:t>find . –name “*.</a:t>
+            </a:r>
+            <a:r>
+              <a:rPr lang="en-US" sz="2400" dirty="0" err="1" smtClean="0"/>
+              <a:t>json</a:t>
+            </a:r>
+            <a:r>
+              <a:rPr lang="en-US" sz="2400" dirty="0" smtClean="0"/>
+              <a:t>”: </a:t>
+            </a:r>
+            <a:r>
+              <a:rPr lang="en-US" sz="2400" dirty="0" err="1" smtClean="0"/>
+              <a:t>tìm</a:t>
+            </a:r>
+            <a:r>
+              <a:rPr lang="en-US" sz="2400" dirty="0" smtClean="0"/>
+              <a:t> </a:t>
+            </a:r>
+            <a:r>
+              <a:rPr lang="en-US" sz="2400" dirty="0" err="1" smtClean="0"/>
+              <a:t>các</a:t>
+            </a:r>
+            <a:r>
+              <a:rPr lang="en-US" sz="2400" dirty="0" smtClean="0"/>
+              <a:t> file name </a:t>
+            </a:r>
+            <a:r>
+              <a:rPr lang="en-US" sz="2400" dirty="0" err="1" smtClean="0"/>
+              <a:t>kết</a:t>
+            </a:r>
+            <a:r>
+              <a:rPr lang="en-US" sz="2400" dirty="0" smtClean="0"/>
+              <a:t> </a:t>
+            </a:r>
+            <a:r>
+              <a:rPr lang="en-US" sz="2400" dirty="0" err="1" smtClean="0"/>
+              <a:t>thúc</a:t>
+            </a:r>
+            <a:r>
+              <a:rPr lang="en-US" sz="2400" dirty="0" smtClean="0"/>
+              <a:t> </a:t>
+            </a:r>
+            <a:r>
+              <a:rPr lang="en-US" sz="2400" dirty="0" err="1" smtClean="0"/>
+              <a:t>bằng</a:t>
+            </a:r>
+            <a:r>
+              <a:rPr lang="en-US" sz="2400" dirty="0" smtClean="0"/>
+              <a:t> .</a:t>
+            </a:r>
+            <a:r>
+              <a:rPr lang="en-US" sz="2400" dirty="0" err="1" smtClean="0"/>
+              <a:t>json</a:t>
+            </a:r>
+            <a:endParaRPr lang="en-US" sz="2400" dirty="0" smtClean="0"/>
+          </a:p>
+          <a:p>
+            <a:pPr marL="285750" indent="-285750">
+              <a:buFont typeface="Arial" panose="020B0604020202020204" pitchFamily="34" charset="0"/>
+              <a:buChar char="•"/>
+            </a:pPr>
+            <a:endParaRPr lang="en-US" sz="2400" dirty="0"/>
+          </a:p>
+          <a:p>
+            <a:pPr marL="285750" indent="-285750">
+              <a:buFont typeface="Arial" panose="020B0604020202020204" pitchFamily="34" charset="0"/>
+              <a:buChar char="•"/>
+            </a:pPr>
+            <a:r>
+              <a:rPr lang="en-US" sz="2400" dirty="0" err="1" smtClean="0"/>
+              <a:t>Grep</a:t>
+            </a:r>
+            <a:r>
+              <a:rPr lang="en-US" sz="2400" dirty="0" smtClean="0"/>
+              <a:t> “</a:t>
+            </a:r>
+            <a:r>
+              <a:rPr lang="en-US" sz="2400" dirty="0" err="1" smtClean="0"/>
+              <a:t>abc</a:t>
+            </a:r>
+            <a:r>
+              <a:rPr lang="en-US" sz="2400" dirty="0" smtClean="0"/>
+              <a:t>” xyz: </a:t>
+            </a:r>
+            <a:r>
+              <a:rPr lang="en-US" sz="2400" dirty="0" err="1" smtClean="0"/>
+              <a:t>tìm</a:t>
+            </a:r>
+            <a:r>
+              <a:rPr lang="en-US" sz="2400" dirty="0" smtClean="0"/>
+              <a:t> </a:t>
+            </a:r>
+            <a:r>
+              <a:rPr lang="en-US" sz="2400" dirty="0" err="1" smtClean="0"/>
+              <a:t>dòng</a:t>
+            </a:r>
+            <a:r>
+              <a:rPr lang="en-US" sz="2400" dirty="0" smtClean="0"/>
+              <a:t> </a:t>
+            </a:r>
+            <a:r>
+              <a:rPr lang="en-US" sz="2400" dirty="0" err="1" smtClean="0"/>
+              <a:t>có</a:t>
+            </a:r>
+            <a:r>
+              <a:rPr lang="en-US" sz="2400" dirty="0" smtClean="0"/>
+              <a:t> </a:t>
+            </a:r>
+            <a:r>
+              <a:rPr lang="en-US" sz="2400" dirty="0" err="1" smtClean="0"/>
+              <a:t>từ</a:t>
+            </a:r>
+            <a:r>
+              <a:rPr lang="en-US" sz="2400" dirty="0" smtClean="0"/>
+              <a:t> “</a:t>
+            </a:r>
+            <a:r>
+              <a:rPr lang="en-US" sz="2400" dirty="0" err="1" smtClean="0"/>
+              <a:t>abc</a:t>
+            </a:r>
+            <a:r>
+              <a:rPr lang="en-US" sz="2400" dirty="0" smtClean="0"/>
+              <a:t>” </a:t>
+            </a:r>
+            <a:r>
+              <a:rPr lang="en-US" sz="2400" dirty="0" err="1" smtClean="0"/>
+              <a:t>trong</a:t>
+            </a:r>
+            <a:r>
+              <a:rPr lang="en-US" sz="2400" dirty="0" smtClean="0"/>
+              <a:t> file xyz</a:t>
+            </a:r>
+          </a:p>
+          <a:p>
+            <a:pPr marL="285750" indent="-285750">
+              <a:buFont typeface="Arial" panose="020B0604020202020204" pitchFamily="34" charset="0"/>
+              <a:buChar char="•"/>
+            </a:pPr>
+            <a:endParaRPr lang="en-US" sz="2400" dirty="0"/>
+          </a:p>
+          <a:p>
+            <a:pPr marL="285750" indent="-285750">
+              <a:buFont typeface="Arial" panose="020B0604020202020204" pitchFamily="34" charset="0"/>
+              <a:buChar char="•"/>
+            </a:pPr>
+            <a:r>
+              <a:rPr lang="en-US" sz="2400" dirty="0" smtClean="0"/>
+              <a:t>Man </a:t>
+            </a:r>
+            <a:r>
+              <a:rPr lang="en-US" sz="2400" dirty="0" err="1" smtClean="0"/>
+              <a:t>abc</a:t>
+            </a:r>
+            <a:r>
+              <a:rPr lang="en-US" sz="2400" dirty="0" smtClean="0"/>
+              <a:t>: </a:t>
+            </a:r>
+            <a:r>
+              <a:rPr lang="en-US" sz="2400" dirty="0" err="1" smtClean="0"/>
+              <a:t>xem</a:t>
+            </a:r>
+            <a:r>
+              <a:rPr lang="en-US" sz="2400" dirty="0" smtClean="0"/>
+              <a:t> manual </a:t>
+            </a:r>
+            <a:r>
+              <a:rPr lang="en-US" sz="2400" dirty="0" err="1" smtClean="0"/>
+              <a:t>của</a:t>
+            </a:r>
+            <a:r>
+              <a:rPr lang="en-US" sz="2400" dirty="0" smtClean="0"/>
+              <a:t> </a:t>
+            </a:r>
+            <a:r>
+              <a:rPr lang="en-US" sz="2400" dirty="0" err="1" smtClean="0"/>
+              <a:t>lệnh</a:t>
+            </a:r>
+            <a:r>
+              <a:rPr lang="en-US" sz="2400" dirty="0" smtClean="0"/>
+              <a:t> </a:t>
+            </a:r>
+            <a:r>
+              <a:rPr lang="en-US" sz="2400" dirty="0" err="1" smtClean="0"/>
+              <a:t>abc</a:t>
+            </a:r>
+            <a:endParaRPr lang="en-US" sz="2400" dirty="0" smtClean="0"/>
+          </a:p>
+          <a:p>
+            <a:pPr marL="285750" indent="-285750">
+              <a:buFont typeface="Arial" panose="020B0604020202020204" pitchFamily="34" charset="0"/>
+              <a:buChar char="•"/>
+            </a:pPr>
+            <a:endParaRPr lang="en-US" sz="2400" dirty="0"/>
+          </a:p>
+          <a:p>
+            <a:pPr marL="285750" indent="-285750">
+              <a:buFont typeface="Arial" panose="020B0604020202020204" pitchFamily="34" charset="0"/>
+              <a:buChar char="•"/>
+            </a:pPr>
+            <a:r>
+              <a:rPr lang="en-US" sz="2400" dirty="0" smtClean="0"/>
+              <a:t>Code . : </a:t>
+            </a:r>
+            <a:r>
+              <a:rPr lang="en-US" sz="2400" dirty="0" err="1" smtClean="0"/>
+              <a:t>mở</a:t>
+            </a:r>
+            <a:r>
+              <a:rPr lang="en-US" sz="2400" dirty="0" smtClean="0"/>
+              <a:t> folder </a:t>
+            </a:r>
+            <a:r>
+              <a:rPr lang="en-US" sz="2400" dirty="0" err="1" smtClean="0"/>
+              <a:t>trong</a:t>
+            </a:r>
+            <a:r>
+              <a:rPr lang="en-US" sz="2400" dirty="0" smtClean="0"/>
+              <a:t> </a:t>
+            </a:r>
+            <a:r>
+              <a:rPr lang="en-US" sz="2400" dirty="0" err="1" smtClean="0"/>
+              <a:t>vsc</a:t>
+            </a:r>
+            <a:endParaRPr lang="en-US" sz="2400" dirty="0" smtClean="0"/>
+          </a:p>
+        </p:txBody>
+      </p:sp>
+    </p:spTree>
+    <p:extLst>
+      <p:ext uri="{BB962C8B-B14F-4D97-AF65-F5344CB8AC3E}">
+        <p14:creationId xmlns:p14="http://schemas.microsoft.com/office/powerpoint/2010/main" val="3639718028"/>
+      </p:ext>
+    </p:extLst>
+  </p:cSld>
+  <p:clrMapOvr>
+    <a:masterClrMapping/>
+  </p:clrMapOvr>
+  <p:timing>
+    <p:tnLst>
+      <p:par>
+        <p:cTn id="1" dur="indefinite" restart="never" nodeType="tmRoot"/>
+      </p:par>
+    </p:tnLst>
+  </p:timing>
+</p:sld>
+</file>
+
+<file path=ppt/slides/slide6.xml><?xml version="1.0" encoding="utf-8"?>
+<p:sld xmlns:a="http://schemas.openxmlformats.org/drawingml/2006/main" xmlns:r="http://schemas.openxmlformats.org/officeDocument/2006/relationships" xmlns:p="http://schemas.openxmlformats.org/presentationml/2006/main">
+  <p:cSld>
+    <p:spTree>
+      <p:nvGrpSpPr>
+        <p:cNvPr id="1" name=""/>
+        <p:cNvGrpSpPr/>
+        <p:nvPr/>
+      </p:nvGrpSpPr>
+      <p:grpSpPr>
+        <a:xfrm>
+          <a:off x="0" y="0"/>
+          <a:ext cx="0" cy="0"/>
+          <a:chOff x="0" y="0"/>
+          <a:chExt cx="0" cy="0"/>
+        </a:xfrm>
+      </p:grpSpPr>
+      <p:cxnSp>
+        <p:nvCxnSpPr>
+          <p:cNvPr id="6" name="Straight Connector 5"/>
+          <p:cNvCxnSpPr/>
+          <p:nvPr/>
+        </p:nvCxnSpPr>
+        <p:spPr>
+          <a:xfrm>
+            <a:off x="420907" y="6517696"/>
+            <a:ext cx="11430000" cy="0"/>
+          </a:xfrm>
+          <a:prstGeom prst="line">
+            <a:avLst/>
+          </a:prstGeom>
+        </p:spPr>
+        <p:style>
+          <a:lnRef idx="1">
+            <a:schemeClr val="accent1"/>
+          </a:lnRef>
+          <a:fillRef idx="0">
+            <a:schemeClr val="accent1"/>
+          </a:fillRef>
+          <a:effectRef idx="0">
+            <a:schemeClr val="accent1"/>
+          </a:effectRef>
+          <a:fontRef idx="minor">
+            <a:schemeClr val="tx1"/>
+          </a:fontRef>
+        </p:style>
+      </p:cxnSp>
+      <p:sp>
+        <p:nvSpPr>
+          <p:cNvPr id="5" name="Date Placeholder 4"/>
+          <p:cNvSpPr>
+            <a:spLocks noGrp="1"/>
+          </p:cNvSpPr>
+          <p:nvPr>
+            <p:ph type="dt" sz="half" idx="10"/>
+          </p:nvPr>
+        </p:nvSpPr>
+        <p:spPr>
+          <a:xfrm>
+            <a:off x="348328" y="6492875"/>
+            <a:ext cx="2743200" cy="365124"/>
+          </a:xfrm>
+        </p:spPr>
+        <p:txBody>
+          <a:bodyPr/>
+          <a:lstStyle/>
+          <a:p>
+            <a:fld id="{584BC27B-D6E5-4158-AEF2-1A466C5D5036}" type="datetime1">
+              <a:rPr lang="en-US" b="1" smtClean="0">
+                <a:solidFill>
+                  <a:srgbClr val="00B050"/>
+                </a:solidFill>
+                <a:latin typeface="Cambria" panose="02040503050406030204" pitchFamily="18" charset="0"/>
+                <a:ea typeface="Cambria" panose="02040503050406030204" pitchFamily="18" charset="0"/>
+              </a:rPr>
+              <a:t>10/3/2020</a:t>
+            </a:fld>
+            <a:endParaRPr lang="en-US" b="1" dirty="0">
+              <a:solidFill>
+                <a:srgbClr val="00B050"/>
+              </a:solidFill>
+              <a:latin typeface="Cambria" panose="02040503050406030204" pitchFamily="18" charset="0"/>
+              <a:ea typeface="Cambria" panose="02040503050406030204" pitchFamily="18" charset="0"/>
+            </a:endParaRPr>
+          </a:p>
+        </p:txBody>
+      </p:sp>
+      <p:sp>
+        <p:nvSpPr>
+          <p:cNvPr id="7" name="Footer Placeholder 6"/>
+          <p:cNvSpPr>
+            <a:spLocks noGrp="1"/>
+          </p:cNvSpPr>
+          <p:nvPr>
+            <p:ph type="ftr" sz="quarter" idx="11"/>
+          </p:nvPr>
+        </p:nvSpPr>
+        <p:spPr>
+          <a:xfrm>
+            <a:off x="9739086" y="6516914"/>
+            <a:ext cx="2184399" cy="341086"/>
+          </a:xfrm>
+        </p:spPr>
+        <p:txBody>
+          <a:bodyPr/>
+          <a:lstStyle/>
+          <a:p>
+            <a:pPr algn="r"/>
+            <a:r>
+              <a:rPr lang="en-US" b="1" dirty="0" err="1" smtClean="0">
+                <a:solidFill>
+                  <a:srgbClr val="00B050"/>
+                </a:solidFill>
+                <a:latin typeface="Cambria" panose="02040503050406030204" pitchFamily="18" charset="0"/>
+                <a:ea typeface="Cambria" panose="02040503050406030204" pitchFamily="18" charset="0"/>
+              </a:rPr>
+              <a:t>Tuấn</a:t>
+            </a:r>
+            <a:r>
+              <a:rPr lang="en-US" b="1" dirty="0" smtClean="0">
+                <a:solidFill>
+                  <a:srgbClr val="00B050"/>
+                </a:solidFill>
+                <a:latin typeface="Cambria" panose="02040503050406030204" pitchFamily="18" charset="0"/>
+                <a:ea typeface="Cambria" panose="02040503050406030204" pitchFamily="18" charset="0"/>
+              </a:rPr>
+              <a:t> Khoa</a:t>
+            </a:r>
+            <a:endParaRPr lang="en-US" b="1" dirty="0">
+              <a:solidFill>
+                <a:srgbClr val="00B050"/>
+              </a:solidFill>
+              <a:latin typeface="Cambria" panose="02040503050406030204" pitchFamily="18" charset="0"/>
+              <a:ea typeface="Cambria" panose="02040503050406030204" pitchFamily="18" charset="0"/>
+            </a:endParaRPr>
+          </a:p>
+        </p:txBody>
+      </p:sp>
+      <p:sp>
+        <p:nvSpPr>
+          <p:cNvPr id="8" name="Slide Number Placeholder 7"/>
+          <p:cNvSpPr>
+            <a:spLocks noGrp="1"/>
+          </p:cNvSpPr>
+          <p:nvPr>
+            <p:ph type="sldNum" sz="quarter" idx="12"/>
+          </p:nvPr>
+        </p:nvSpPr>
+        <p:spPr>
+          <a:xfrm>
+            <a:off x="4764307" y="6542518"/>
+            <a:ext cx="2743200" cy="315481"/>
+          </a:xfrm>
+        </p:spPr>
+        <p:txBody>
+          <a:bodyPr/>
+          <a:lstStyle/>
+          <a:p>
+            <a:pPr algn="ctr"/>
+            <a:fld id="{CEE3C117-CD36-4311-9030-17CD772F032C}" type="slidenum">
+              <a:rPr lang="en-US" b="1" smtClean="0">
+                <a:solidFill>
+                  <a:srgbClr val="00B050"/>
+                </a:solidFill>
+                <a:latin typeface="Cambria" panose="02040503050406030204" pitchFamily="18" charset="0"/>
+                <a:ea typeface="Cambria" panose="02040503050406030204" pitchFamily="18" charset="0"/>
+              </a:rPr>
+              <a:pPr algn="ctr"/>
+              <a:t>6</a:t>
+            </a:fld>
+            <a:endParaRPr lang="en-US" b="1" dirty="0">
+              <a:solidFill>
+                <a:srgbClr val="00B050"/>
+              </a:solidFill>
+              <a:latin typeface="Cambria" panose="02040503050406030204" pitchFamily="18" charset="0"/>
+              <a:ea typeface="Cambria" panose="02040503050406030204" pitchFamily="18" charset="0"/>
+            </a:endParaRPr>
+          </a:p>
+        </p:txBody>
+      </p:sp>
+      <p:sp>
+        <p:nvSpPr>
+          <p:cNvPr id="2" name="TextBox 1"/>
+          <p:cNvSpPr txBox="1"/>
+          <p:nvPr/>
+        </p:nvSpPr>
+        <p:spPr>
+          <a:xfrm>
+            <a:off x="551529" y="203198"/>
+            <a:ext cx="11502578" cy="584775"/>
+          </a:xfrm>
+          <a:prstGeom prst="rect">
+            <a:avLst/>
+          </a:prstGeom>
+          <a:noFill/>
+        </p:spPr>
+        <p:txBody>
+          <a:bodyPr wrap="square" rtlCol="0">
+            <a:spAutoFit/>
+          </a:bodyPr>
+          <a:lstStyle/>
+          <a:p>
+            <a:r>
+              <a:rPr lang="en-US" sz="3200" b="1" dirty="0" err="1" smtClean="0">
+                <a:solidFill>
+                  <a:srgbClr val="0070C0"/>
+                </a:solidFill>
+                <a:ea typeface="Cambria" panose="02040503050406030204" pitchFamily="18" charset="0"/>
+              </a:rPr>
+              <a:t>Các</a:t>
+            </a:r>
+            <a:r>
+              <a:rPr lang="en-US" sz="3200" b="1" dirty="0" smtClean="0">
+                <a:solidFill>
+                  <a:srgbClr val="0070C0"/>
+                </a:solidFill>
+                <a:ea typeface="Cambria" panose="02040503050406030204" pitchFamily="18" charset="0"/>
+              </a:rPr>
+              <a:t> </a:t>
+            </a:r>
+            <a:r>
+              <a:rPr lang="en-US" sz="3200" b="1" dirty="0" err="1" smtClean="0">
+                <a:solidFill>
+                  <a:srgbClr val="0070C0"/>
+                </a:solidFill>
+                <a:ea typeface="Cambria" panose="02040503050406030204" pitchFamily="18" charset="0"/>
+              </a:rPr>
+              <a:t>lệnh</a:t>
+            </a:r>
+            <a:r>
+              <a:rPr lang="en-US" sz="3200" b="1" dirty="0" smtClean="0">
+                <a:solidFill>
+                  <a:srgbClr val="0070C0"/>
+                </a:solidFill>
+                <a:ea typeface="Cambria" panose="02040503050406030204" pitchFamily="18" charset="0"/>
+              </a:rPr>
+              <a:t> </a:t>
+            </a:r>
+            <a:r>
+              <a:rPr lang="en-US" sz="3200" b="1" dirty="0" err="1" smtClean="0">
+                <a:solidFill>
+                  <a:srgbClr val="0070C0"/>
+                </a:solidFill>
+                <a:ea typeface="Cambria" panose="02040503050406030204" pitchFamily="18" charset="0"/>
+              </a:rPr>
+              <a:t>khác</a:t>
+            </a:r>
+            <a:endParaRPr lang="en-US" sz="3200" b="1" dirty="0">
+              <a:solidFill>
+                <a:srgbClr val="0070C0"/>
+              </a:solidFill>
+              <a:ea typeface="Cambria" panose="02040503050406030204" pitchFamily="18" charset="0"/>
+            </a:endParaRPr>
+          </a:p>
+        </p:txBody>
+      </p:sp>
+      <p:cxnSp>
+        <p:nvCxnSpPr>
+          <p:cNvPr id="4" name="Straight Connector 3"/>
+          <p:cNvCxnSpPr/>
+          <p:nvPr/>
+        </p:nvCxnSpPr>
+        <p:spPr>
+          <a:xfrm flipV="1">
+            <a:off x="624107" y="769961"/>
+            <a:ext cx="2743200" cy="0"/>
+          </a:xfrm>
+          <a:prstGeom prst="line">
+            <a:avLst/>
+          </a:prstGeom>
+          <a:ln w="38100"/>
+        </p:spPr>
+        <p:style>
+          <a:lnRef idx="3">
+            <a:schemeClr val="accent6"/>
+          </a:lnRef>
+          <a:fillRef idx="0">
+            <a:schemeClr val="accent6"/>
+          </a:fillRef>
+          <a:effectRef idx="2">
+            <a:schemeClr val="accent6"/>
+          </a:effectRef>
+          <a:fontRef idx="minor">
+            <a:schemeClr val="tx1"/>
+          </a:fontRef>
+        </p:style>
+      </p:cxnSp>
+      <p:sp>
+        <p:nvSpPr>
+          <p:cNvPr id="3" name="TextBox 2"/>
+          <p:cNvSpPr txBox="1"/>
+          <p:nvPr/>
+        </p:nvSpPr>
+        <p:spPr>
+          <a:xfrm>
+            <a:off x="624107" y="1175657"/>
+            <a:ext cx="10871207" cy="1938992"/>
+          </a:xfrm>
+          <a:prstGeom prst="rect">
+            <a:avLst/>
+          </a:prstGeom>
+          <a:noFill/>
+        </p:spPr>
+        <p:txBody>
+          <a:bodyPr wrap="square" rtlCol="0">
+            <a:spAutoFit/>
+          </a:bodyPr>
+          <a:lstStyle/>
+          <a:p>
+            <a:pPr marL="285750" indent="-285750">
+              <a:buFont typeface="Arial" panose="020B0604020202020204" pitchFamily="34" charset="0"/>
+              <a:buChar char="•"/>
+            </a:pPr>
+            <a:r>
+              <a:rPr lang="en-US" sz="2400" dirty="0" err="1" smtClean="0"/>
+              <a:t>Ssh</a:t>
+            </a:r>
+            <a:r>
+              <a:rPr lang="en-US" sz="2400" dirty="0" smtClean="0"/>
+              <a:t> </a:t>
+            </a:r>
+            <a:r>
+              <a:rPr lang="en-US" sz="2400" dirty="0" err="1" smtClean="0"/>
+              <a:t>abc@xyz</a:t>
+            </a:r>
+            <a:r>
+              <a:rPr lang="en-US" sz="2400" dirty="0" smtClean="0"/>
+              <a:t>: </a:t>
+            </a:r>
+            <a:r>
+              <a:rPr lang="en-US" sz="2400" dirty="0" err="1" smtClean="0"/>
+              <a:t>truy</a:t>
+            </a:r>
+            <a:r>
+              <a:rPr lang="en-US" sz="2400" dirty="0" smtClean="0"/>
+              <a:t> </a:t>
+            </a:r>
+            <a:r>
+              <a:rPr lang="en-US" sz="2400" dirty="0" err="1" smtClean="0"/>
+              <a:t>cập</a:t>
+            </a:r>
+            <a:r>
+              <a:rPr lang="en-US" sz="2400" dirty="0" smtClean="0"/>
+              <a:t> </a:t>
+            </a:r>
+            <a:r>
+              <a:rPr lang="en-US" sz="2400" dirty="0" err="1" smtClean="0"/>
+              <a:t>bảo</a:t>
+            </a:r>
+            <a:r>
+              <a:rPr lang="en-US" sz="2400" dirty="0" smtClean="0"/>
+              <a:t> </a:t>
+            </a:r>
+            <a:r>
+              <a:rPr lang="en-US" sz="2400" dirty="0" err="1" smtClean="0"/>
+              <a:t>mật</a:t>
+            </a:r>
+            <a:r>
+              <a:rPr lang="en-US" sz="2400" dirty="0" smtClean="0"/>
+              <a:t> </a:t>
+            </a:r>
+            <a:r>
+              <a:rPr lang="en-US" sz="2400" dirty="0" err="1" smtClean="0"/>
+              <a:t>vào</a:t>
+            </a:r>
+            <a:r>
+              <a:rPr lang="en-US" sz="2400" dirty="0" smtClean="0"/>
+              <a:t> shell </a:t>
+            </a:r>
+            <a:r>
+              <a:rPr lang="en-US" sz="2400" dirty="0" err="1" smtClean="0"/>
+              <a:t>của</a:t>
+            </a:r>
+            <a:r>
+              <a:rPr lang="en-US" sz="2400" dirty="0" smtClean="0"/>
+              <a:t> </a:t>
+            </a:r>
+            <a:r>
+              <a:rPr lang="en-US" sz="2400" dirty="0" err="1" smtClean="0"/>
+              <a:t>máy</a:t>
+            </a:r>
+            <a:r>
+              <a:rPr lang="en-US" sz="2400" dirty="0" smtClean="0"/>
+              <a:t> </a:t>
+            </a:r>
+            <a:r>
+              <a:rPr lang="en-US" sz="2400" dirty="0" err="1" smtClean="0"/>
+              <a:t>tính</a:t>
+            </a:r>
+            <a:r>
+              <a:rPr lang="en-US" sz="2400" dirty="0" smtClean="0"/>
+              <a:t> </a:t>
+            </a:r>
+            <a:r>
+              <a:rPr lang="en-US" sz="2400" dirty="0" err="1" smtClean="0"/>
+              <a:t>abc@xyz</a:t>
+            </a:r>
+            <a:endParaRPr lang="en-US" sz="2400" dirty="0" smtClean="0"/>
+          </a:p>
+          <a:p>
+            <a:pPr marL="285750" indent="-285750">
+              <a:buFont typeface="Arial" panose="020B0604020202020204" pitchFamily="34" charset="0"/>
+              <a:buChar char="•"/>
+            </a:pPr>
+            <a:endParaRPr lang="en-US" sz="2400" dirty="0"/>
+          </a:p>
+          <a:p>
+            <a:pPr marL="285750" indent="-285750">
+              <a:buFont typeface="Arial" panose="020B0604020202020204" pitchFamily="34" charset="0"/>
+              <a:buChar char="•"/>
+            </a:pPr>
+            <a:r>
+              <a:rPr lang="en-US" sz="2400" dirty="0" smtClean="0"/>
+              <a:t>Top: </a:t>
+            </a:r>
+            <a:r>
+              <a:rPr lang="en-US" sz="2400" dirty="0" err="1" smtClean="0"/>
+              <a:t>xem</a:t>
+            </a:r>
+            <a:r>
+              <a:rPr lang="en-US" sz="2400" dirty="0" smtClean="0"/>
+              <a:t> </a:t>
+            </a:r>
+            <a:r>
+              <a:rPr lang="en-US" sz="2400" dirty="0" err="1" smtClean="0"/>
+              <a:t>các</a:t>
+            </a:r>
+            <a:r>
+              <a:rPr lang="en-US" sz="2400" dirty="0" smtClean="0"/>
+              <a:t> task manager </a:t>
+            </a:r>
+            <a:r>
+              <a:rPr lang="en-US" sz="2400" dirty="0" err="1" smtClean="0"/>
+              <a:t>của</a:t>
+            </a:r>
+            <a:r>
+              <a:rPr lang="en-US" sz="2400" dirty="0" smtClean="0"/>
+              <a:t> </a:t>
+            </a:r>
+            <a:r>
+              <a:rPr lang="en-US" sz="2400" dirty="0" err="1" smtClean="0"/>
+              <a:t>máy</a:t>
+            </a:r>
+            <a:r>
+              <a:rPr lang="en-US" sz="2400" dirty="0" smtClean="0"/>
+              <a:t> </a:t>
+            </a:r>
+            <a:r>
+              <a:rPr lang="en-US" sz="2400" dirty="0" err="1" smtClean="0"/>
+              <a:t>tính</a:t>
+            </a:r>
+            <a:endParaRPr lang="en-US" sz="2400" dirty="0" smtClean="0"/>
+          </a:p>
+          <a:p>
+            <a:pPr marL="285750" indent="-285750">
+              <a:buFont typeface="Arial" panose="020B0604020202020204" pitchFamily="34" charset="0"/>
+              <a:buChar char="•"/>
+            </a:pPr>
+            <a:endParaRPr lang="en-US" sz="2400" dirty="0"/>
+          </a:p>
+          <a:p>
+            <a:pPr marL="285750" indent="-285750">
+              <a:buFont typeface="Arial" panose="020B0604020202020204" pitchFamily="34" charset="0"/>
+              <a:buChar char="•"/>
+            </a:pPr>
+            <a:r>
+              <a:rPr lang="en-US" sz="2400" dirty="0" smtClean="0"/>
+              <a:t>Kill -9 -1234: </a:t>
+            </a:r>
+            <a:r>
+              <a:rPr lang="en-US" sz="2400" dirty="0" err="1" smtClean="0"/>
+              <a:t>tắt</a:t>
+            </a:r>
+            <a:r>
+              <a:rPr lang="en-US" sz="2400" dirty="0" smtClean="0"/>
+              <a:t> task </a:t>
+            </a:r>
+            <a:r>
+              <a:rPr lang="en-US" sz="2400" dirty="0" err="1" smtClean="0"/>
+              <a:t>có</a:t>
+            </a:r>
+            <a:r>
+              <a:rPr lang="en-US" sz="2400" smtClean="0"/>
+              <a:t> id 1234</a:t>
+            </a:r>
+            <a:endParaRPr lang="en-US" sz="2400" dirty="0" smtClean="0"/>
+          </a:p>
+        </p:txBody>
+      </p:sp>
+    </p:spTree>
+    <p:extLst>
+      <p:ext uri="{BB962C8B-B14F-4D97-AF65-F5344CB8AC3E}">
+        <p14:creationId xmlns:p14="http://schemas.microsoft.com/office/powerpoint/2010/main" val="304404891"/>
       </p:ext>
     </p:extLst>
   </p:cSld>

</xml_diff>